<commit_message>
Adição dos .pdf e .pptx das Telas do Sistema Dionísio.
</commit_message>
<xml_diff>
--- a/Telas-DIONISIO.pptx
+++ b/Telas-DIONISIO.pptx
@@ -22,6 +22,7 @@
     <p:sldId id="267" r:id="rId16"/>
     <p:sldId id="268" r:id="rId17"/>
     <p:sldId id="269" r:id="rId18"/>
+    <p:sldId id="270" r:id="rId19"/>
   </p:sldIdLst>
   <p:sldSz cy="6858000" cx="12192000"/>
   <p:notesSz cx="6858000" cy="9144000"/>
@@ -783,7 +784,7 @@
   <p:cSld>
     <p:spTree>
       <p:nvGrpSpPr>
-        <p:cNvPr id="125" name="Shape 125"/>
+        <p:cNvPr id="126" name="Shape 126"/>
         <p:cNvGrpSpPr/>
         <p:nvPr/>
       </p:nvGrpSpPr>
@@ -797,7 +798,7 @@
       </p:grpSpPr>
       <p:sp>
         <p:nvSpPr>
-          <p:cNvPr id="126" name="Shape 126"/>
+          <p:cNvPr id="127" name="Shape 127"/>
           <p:cNvSpPr/>
           <p:nvPr>
             <p:ph idx="2" type="sldImg"/>
@@ -831,7 +832,7 @@
       </p:sp>
       <p:sp>
         <p:nvSpPr>
-          <p:cNvPr id="127" name="Shape 127"/>
+          <p:cNvPr id="128" name="Shape 128"/>
           <p:cNvSpPr txBox="1"/>
           <p:nvPr>
             <p:ph idx="1" type="body"/>
@@ -881,7 +882,7 @@
   <p:cSld>
     <p:spTree>
       <p:nvGrpSpPr>
-        <p:cNvPr id="130" name="Shape 130"/>
+        <p:cNvPr id="131" name="Shape 131"/>
         <p:cNvGrpSpPr/>
         <p:nvPr/>
       </p:nvGrpSpPr>
@@ -895,7 +896,7 @@
       </p:grpSpPr>
       <p:sp>
         <p:nvSpPr>
-          <p:cNvPr id="131" name="Shape 131"/>
+          <p:cNvPr id="132" name="Shape 132"/>
           <p:cNvSpPr/>
           <p:nvPr>
             <p:ph idx="2" type="sldImg"/>
@@ -929,7 +930,7 @@
       </p:sp>
       <p:sp>
         <p:nvSpPr>
-          <p:cNvPr id="132" name="Shape 132"/>
+          <p:cNvPr id="133" name="Shape 133"/>
           <p:cNvSpPr txBox="1"/>
           <p:nvPr>
             <p:ph idx="1" type="body"/>
@@ -979,7 +980,7 @@
   <p:cSld>
     <p:spTree>
       <p:nvGrpSpPr>
-        <p:cNvPr id="135" name="Shape 135"/>
+        <p:cNvPr id="136" name="Shape 136"/>
         <p:cNvGrpSpPr/>
         <p:nvPr/>
       </p:nvGrpSpPr>
@@ -993,7 +994,7 @@
       </p:grpSpPr>
       <p:sp>
         <p:nvSpPr>
-          <p:cNvPr id="136" name="Shape 136"/>
+          <p:cNvPr id="137" name="Shape 137"/>
           <p:cNvSpPr/>
           <p:nvPr>
             <p:ph idx="2" type="sldImg"/>
@@ -1027,7 +1028,7 @@
       </p:sp>
       <p:sp>
         <p:nvSpPr>
-          <p:cNvPr id="137" name="Shape 137"/>
+          <p:cNvPr id="138" name="Shape 138"/>
           <p:cNvSpPr txBox="1"/>
           <p:nvPr>
             <p:ph idx="1" type="body"/>
@@ -1077,7 +1078,7 @@
   <p:cSld>
     <p:spTree>
       <p:nvGrpSpPr>
-        <p:cNvPr id="140" name="Shape 140"/>
+        <p:cNvPr id="141" name="Shape 141"/>
         <p:cNvGrpSpPr/>
         <p:nvPr/>
       </p:nvGrpSpPr>
@@ -1091,7 +1092,7 @@
       </p:grpSpPr>
       <p:sp>
         <p:nvSpPr>
-          <p:cNvPr id="141" name="Shape 141"/>
+          <p:cNvPr id="142" name="Shape 142"/>
           <p:cNvSpPr/>
           <p:nvPr>
             <p:ph idx="2" type="sldImg"/>
@@ -1125,7 +1126,7 @@
       </p:sp>
       <p:sp>
         <p:nvSpPr>
-          <p:cNvPr id="142" name="Shape 142"/>
+          <p:cNvPr id="143" name="Shape 143"/>
           <p:cNvSpPr txBox="1"/>
           <p:nvPr>
             <p:ph idx="1" type="body"/>
@@ -1175,7 +1176,7 @@
   <p:cSld>
     <p:spTree>
       <p:nvGrpSpPr>
-        <p:cNvPr id="145" name="Shape 145"/>
+        <p:cNvPr id="146" name="Shape 146"/>
         <p:cNvGrpSpPr/>
         <p:nvPr/>
       </p:nvGrpSpPr>
@@ -1189,7 +1190,7 @@
       </p:grpSpPr>
       <p:sp>
         <p:nvSpPr>
-          <p:cNvPr id="146" name="Shape 146"/>
+          <p:cNvPr id="147" name="Shape 147"/>
           <p:cNvSpPr/>
           <p:nvPr>
             <p:ph idx="2" type="sldImg"/>
@@ -1223,7 +1224,7 @@
       </p:sp>
       <p:sp>
         <p:nvSpPr>
-          <p:cNvPr id="147" name="Shape 147"/>
+          <p:cNvPr id="148" name="Shape 148"/>
           <p:cNvSpPr txBox="1"/>
           <p:nvPr>
             <p:ph idx="1" type="body"/>
@@ -1268,12 +1269,12 @@
 </p:notes>
 </file>
 
-<file path=ppt/notesSlides/notesSlide2.xml><?xml version="1.0" encoding="utf-8"?>
+<file path=ppt/notesSlides/notesSlide15.xml><?xml version="1.0" encoding="utf-8"?>
 <p:notes xmlns:a="http://schemas.openxmlformats.org/drawingml/2006/main" xmlns:r="http://schemas.openxmlformats.org/officeDocument/2006/relationships" xmlns:mc="http://schemas.openxmlformats.org/markup-compatibility/2006" xmlns:mv="urn:schemas-microsoft-com:mac:vml" xmlns:p="http://schemas.openxmlformats.org/presentationml/2006/main" xmlns:c="http://schemas.openxmlformats.org/drawingml/2006/chart" xmlns:dgm="http://schemas.openxmlformats.org/drawingml/2006/diagram" xmlns:o="urn:schemas-microsoft-com:office:office" xmlns:v="urn:schemas-microsoft-com:vml" xmlns:pvml="urn:schemas-microsoft-com:office:powerpoint" xmlns:com="http://schemas.openxmlformats.org/drawingml/2006/compatibility" xmlns:p14="http://schemas.microsoft.com/office/powerpoint/2010/main" xmlns:p15="http://schemas.microsoft.com/office/powerpoint/2012/main" showMasterPhAnim="0" showMasterSp="0">
   <p:cSld>
     <p:spTree>
       <p:nvGrpSpPr>
-        <p:cNvPr id="85" name="Shape 85"/>
+        <p:cNvPr id="151" name="Shape 151"/>
         <p:cNvGrpSpPr/>
         <p:nvPr/>
       </p:nvGrpSpPr>
@@ -1287,7 +1288,7 @@
       </p:grpSpPr>
       <p:sp>
         <p:nvSpPr>
-          <p:cNvPr id="86" name="Shape 86"/>
+          <p:cNvPr id="152" name="Shape 152"/>
           <p:cNvSpPr/>
           <p:nvPr>
             <p:ph idx="2" type="sldImg"/>
@@ -1321,7 +1322,7 @@
       </p:sp>
       <p:sp>
         <p:nvSpPr>
-          <p:cNvPr id="87" name="Shape 87"/>
+          <p:cNvPr id="153" name="Shape 153"/>
           <p:cNvSpPr txBox="1"/>
           <p:nvPr>
             <p:ph idx="1" type="body"/>
@@ -1366,12 +1367,12 @@
 </p:notes>
 </file>
 
-<file path=ppt/notesSlides/notesSlide3.xml><?xml version="1.0" encoding="utf-8"?>
+<file path=ppt/notesSlides/notesSlide2.xml><?xml version="1.0" encoding="utf-8"?>
 <p:notes xmlns:a="http://schemas.openxmlformats.org/drawingml/2006/main" xmlns:r="http://schemas.openxmlformats.org/officeDocument/2006/relationships" xmlns:mc="http://schemas.openxmlformats.org/markup-compatibility/2006" xmlns:mv="urn:schemas-microsoft-com:mac:vml" xmlns:p="http://schemas.openxmlformats.org/presentationml/2006/main" xmlns:c="http://schemas.openxmlformats.org/drawingml/2006/chart" xmlns:dgm="http://schemas.openxmlformats.org/drawingml/2006/diagram" xmlns:o="urn:schemas-microsoft-com:office:office" xmlns:v="urn:schemas-microsoft-com:vml" xmlns:pvml="urn:schemas-microsoft-com:office:powerpoint" xmlns:com="http://schemas.openxmlformats.org/drawingml/2006/compatibility" xmlns:p14="http://schemas.microsoft.com/office/powerpoint/2010/main" xmlns:p15="http://schemas.microsoft.com/office/powerpoint/2012/main" showMasterPhAnim="0" showMasterSp="0">
   <p:cSld>
     <p:spTree>
       <p:nvGrpSpPr>
-        <p:cNvPr id="90" name="Shape 90"/>
+        <p:cNvPr id="86" name="Shape 86"/>
         <p:cNvGrpSpPr/>
         <p:nvPr/>
       </p:nvGrpSpPr>
@@ -1385,7 +1386,7 @@
       </p:grpSpPr>
       <p:sp>
         <p:nvSpPr>
-          <p:cNvPr id="91" name="Shape 91"/>
+          <p:cNvPr id="87" name="Shape 87"/>
           <p:cNvSpPr/>
           <p:nvPr>
             <p:ph idx="2" type="sldImg"/>
@@ -1419,7 +1420,7 @@
       </p:sp>
       <p:sp>
         <p:nvSpPr>
-          <p:cNvPr id="92" name="Shape 92"/>
+          <p:cNvPr id="88" name="Shape 88"/>
           <p:cNvSpPr txBox="1"/>
           <p:nvPr>
             <p:ph idx="1" type="body"/>
@@ -1464,12 +1465,12 @@
 </p:notes>
 </file>
 
-<file path=ppt/notesSlides/notesSlide4.xml><?xml version="1.0" encoding="utf-8"?>
+<file path=ppt/notesSlides/notesSlide3.xml><?xml version="1.0" encoding="utf-8"?>
 <p:notes xmlns:a="http://schemas.openxmlformats.org/drawingml/2006/main" xmlns:r="http://schemas.openxmlformats.org/officeDocument/2006/relationships" xmlns:mc="http://schemas.openxmlformats.org/markup-compatibility/2006" xmlns:mv="urn:schemas-microsoft-com:mac:vml" xmlns:p="http://schemas.openxmlformats.org/presentationml/2006/main" xmlns:c="http://schemas.openxmlformats.org/drawingml/2006/chart" xmlns:dgm="http://schemas.openxmlformats.org/drawingml/2006/diagram" xmlns:o="urn:schemas-microsoft-com:office:office" xmlns:v="urn:schemas-microsoft-com:vml" xmlns:pvml="urn:schemas-microsoft-com:office:powerpoint" xmlns:com="http://schemas.openxmlformats.org/drawingml/2006/compatibility" xmlns:p14="http://schemas.microsoft.com/office/powerpoint/2010/main" xmlns:p15="http://schemas.microsoft.com/office/powerpoint/2012/main" showMasterPhAnim="0" showMasterSp="0">
   <p:cSld>
     <p:spTree>
       <p:nvGrpSpPr>
-        <p:cNvPr id="95" name="Shape 95"/>
+        <p:cNvPr id="91" name="Shape 91"/>
         <p:cNvGrpSpPr/>
         <p:nvPr/>
       </p:nvGrpSpPr>
@@ -1483,7 +1484,7 @@
       </p:grpSpPr>
       <p:sp>
         <p:nvSpPr>
-          <p:cNvPr id="96" name="Shape 96"/>
+          <p:cNvPr id="92" name="Shape 92"/>
           <p:cNvSpPr/>
           <p:nvPr>
             <p:ph idx="2" type="sldImg"/>
@@ -1517,7 +1518,7 @@
       </p:sp>
       <p:sp>
         <p:nvSpPr>
-          <p:cNvPr id="97" name="Shape 97"/>
+          <p:cNvPr id="93" name="Shape 93"/>
           <p:cNvSpPr txBox="1"/>
           <p:nvPr>
             <p:ph idx="1" type="body"/>
@@ -1562,12 +1563,12 @@
 </p:notes>
 </file>
 
-<file path=ppt/notesSlides/notesSlide5.xml><?xml version="1.0" encoding="utf-8"?>
+<file path=ppt/notesSlides/notesSlide4.xml><?xml version="1.0" encoding="utf-8"?>
 <p:notes xmlns:a="http://schemas.openxmlformats.org/drawingml/2006/main" xmlns:r="http://schemas.openxmlformats.org/officeDocument/2006/relationships" xmlns:mc="http://schemas.openxmlformats.org/markup-compatibility/2006" xmlns:mv="urn:schemas-microsoft-com:mac:vml" xmlns:p="http://schemas.openxmlformats.org/presentationml/2006/main" xmlns:c="http://schemas.openxmlformats.org/drawingml/2006/chart" xmlns:dgm="http://schemas.openxmlformats.org/drawingml/2006/diagram" xmlns:o="urn:schemas-microsoft-com:office:office" xmlns:v="urn:schemas-microsoft-com:vml" xmlns:pvml="urn:schemas-microsoft-com:office:powerpoint" xmlns:com="http://schemas.openxmlformats.org/drawingml/2006/compatibility" xmlns:p14="http://schemas.microsoft.com/office/powerpoint/2010/main" xmlns:p15="http://schemas.microsoft.com/office/powerpoint/2012/main" showMasterPhAnim="0" showMasterSp="0">
   <p:cSld>
     <p:spTree>
       <p:nvGrpSpPr>
-        <p:cNvPr id="100" name="Shape 100"/>
+        <p:cNvPr id="96" name="Shape 96"/>
         <p:cNvGrpSpPr/>
         <p:nvPr/>
       </p:nvGrpSpPr>
@@ -1581,7 +1582,7 @@
       </p:grpSpPr>
       <p:sp>
         <p:nvSpPr>
-          <p:cNvPr id="101" name="Shape 101"/>
+          <p:cNvPr id="97" name="Shape 97"/>
           <p:cNvSpPr/>
           <p:nvPr>
             <p:ph idx="2" type="sldImg"/>
@@ -1615,7 +1616,7 @@
       </p:sp>
       <p:sp>
         <p:nvSpPr>
-          <p:cNvPr id="102" name="Shape 102"/>
+          <p:cNvPr id="98" name="Shape 98"/>
           <p:cNvSpPr txBox="1"/>
           <p:nvPr>
             <p:ph idx="1" type="body"/>
@@ -1660,12 +1661,12 @@
 </p:notes>
 </file>
 
-<file path=ppt/notesSlides/notesSlide6.xml><?xml version="1.0" encoding="utf-8"?>
+<file path=ppt/notesSlides/notesSlide5.xml><?xml version="1.0" encoding="utf-8"?>
 <p:notes xmlns:a="http://schemas.openxmlformats.org/drawingml/2006/main" xmlns:r="http://schemas.openxmlformats.org/officeDocument/2006/relationships" xmlns:mc="http://schemas.openxmlformats.org/markup-compatibility/2006" xmlns:mv="urn:schemas-microsoft-com:mac:vml" xmlns:p="http://schemas.openxmlformats.org/presentationml/2006/main" xmlns:c="http://schemas.openxmlformats.org/drawingml/2006/chart" xmlns:dgm="http://schemas.openxmlformats.org/drawingml/2006/diagram" xmlns:o="urn:schemas-microsoft-com:office:office" xmlns:v="urn:schemas-microsoft-com:vml" xmlns:pvml="urn:schemas-microsoft-com:office:powerpoint" xmlns:com="http://schemas.openxmlformats.org/drawingml/2006/compatibility" xmlns:p14="http://schemas.microsoft.com/office/powerpoint/2010/main" xmlns:p15="http://schemas.microsoft.com/office/powerpoint/2012/main" showMasterPhAnim="0" showMasterSp="0">
   <p:cSld>
     <p:spTree>
       <p:nvGrpSpPr>
-        <p:cNvPr id="105" name="Shape 105"/>
+        <p:cNvPr id="101" name="Shape 101"/>
         <p:cNvGrpSpPr/>
         <p:nvPr/>
       </p:nvGrpSpPr>
@@ -1679,7 +1680,7 @@
       </p:grpSpPr>
       <p:sp>
         <p:nvSpPr>
-          <p:cNvPr id="106" name="Shape 106"/>
+          <p:cNvPr id="102" name="Shape 102"/>
           <p:cNvSpPr/>
           <p:nvPr>
             <p:ph idx="2" type="sldImg"/>
@@ -1713,7 +1714,7 @@
       </p:sp>
       <p:sp>
         <p:nvSpPr>
-          <p:cNvPr id="107" name="Shape 107"/>
+          <p:cNvPr id="103" name="Shape 103"/>
           <p:cNvSpPr txBox="1"/>
           <p:nvPr>
             <p:ph idx="1" type="body"/>
@@ -1758,12 +1759,12 @@
 </p:notes>
 </file>
 
-<file path=ppt/notesSlides/notesSlide7.xml><?xml version="1.0" encoding="utf-8"?>
+<file path=ppt/notesSlides/notesSlide6.xml><?xml version="1.0" encoding="utf-8"?>
 <p:notes xmlns:a="http://schemas.openxmlformats.org/drawingml/2006/main" xmlns:r="http://schemas.openxmlformats.org/officeDocument/2006/relationships" xmlns:mc="http://schemas.openxmlformats.org/markup-compatibility/2006" xmlns:mv="urn:schemas-microsoft-com:mac:vml" xmlns:p="http://schemas.openxmlformats.org/presentationml/2006/main" xmlns:c="http://schemas.openxmlformats.org/drawingml/2006/chart" xmlns:dgm="http://schemas.openxmlformats.org/drawingml/2006/diagram" xmlns:o="urn:schemas-microsoft-com:office:office" xmlns:v="urn:schemas-microsoft-com:vml" xmlns:pvml="urn:schemas-microsoft-com:office:powerpoint" xmlns:com="http://schemas.openxmlformats.org/drawingml/2006/compatibility" xmlns:p14="http://schemas.microsoft.com/office/powerpoint/2010/main" xmlns:p15="http://schemas.microsoft.com/office/powerpoint/2012/main" showMasterPhAnim="0" showMasterSp="0">
   <p:cSld>
     <p:spTree>
       <p:nvGrpSpPr>
-        <p:cNvPr id="110" name="Shape 110"/>
+        <p:cNvPr id="106" name="Shape 106"/>
         <p:cNvGrpSpPr/>
         <p:nvPr/>
       </p:nvGrpSpPr>
@@ -1777,7 +1778,7 @@
       </p:grpSpPr>
       <p:sp>
         <p:nvSpPr>
-          <p:cNvPr id="111" name="Shape 111"/>
+          <p:cNvPr id="107" name="Shape 107"/>
           <p:cNvSpPr/>
           <p:nvPr>
             <p:ph idx="2" type="sldImg"/>
@@ -1811,7 +1812,7 @@
       </p:sp>
       <p:sp>
         <p:nvSpPr>
-          <p:cNvPr id="112" name="Shape 112"/>
+          <p:cNvPr id="108" name="Shape 108"/>
           <p:cNvSpPr txBox="1"/>
           <p:nvPr>
             <p:ph idx="1" type="body"/>
@@ -1856,12 +1857,12 @@
 </p:notes>
 </file>
 
-<file path=ppt/notesSlides/notesSlide8.xml><?xml version="1.0" encoding="utf-8"?>
+<file path=ppt/notesSlides/notesSlide7.xml><?xml version="1.0" encoding="utf-8"?>
 <p:notes xmlns:a="http://schemas.openxmlformats.org/drawingml/2006/main" xmlns:r="http://schemas.openxmlformats.org/officeDocument/2006/relationships" xmlns:mc="http://schemas.openxmlformats.org/markup-compatibility/2006" xmlns:mv="urn:schemas-microsoft-com:mac:vml" xmlns:p="http://schemas.openxmlformats.org/presentationml/2006/main" xmlns:c="http://schemas.openxmlformats.org/drawingml/2006/chart" xmlns:dgm="http://schemas.openxmlformats.org/drawingml/2006/diagram" xmlns:o="urn:schemas-microsoft-com:office:office" xmlns:v="urn:schemas-microsoft-com:vml" xmlns:pvml="urn:schemas-microsoft-com:office:powerpoint" xmlns:com="http://schemas.openxmlformats.org/drawingml/2006/compatibility" xmlns:p14="http://schemas.microsoft.com/office/powerpoint/2010/main" xmlns:p15="http://schemas.microsoft.com/office/powerpoint/2012/main" showMasterPhAnim="0" showMasterSp="0">
   <p:cSld>
     <p:spTree>
       <p:nvGrpSpPr>
-        <p:cNvPr id="115" name="Shape 115"/>
+        <p:cNvPr id="111" name="Shape 111"/>
         <p:cNvGrpSpPr/>
         <p:nvPr/>
       </p:nvGrpSpPr>
@@ -1875,7 +1876,7 @@
       </p:grpSpPr>
       <p:sp>
         <p:nvSpPr>
-          <p:cNvPr id="116" name="Shape 116"/>
+          <p:cNvPr id="112" name="Shape 112"/>
           <p:cNvSpPr/>
           <p:nvPr>
             <p:ph idx="2" type="sldImg"/>
@@ -1909,7 +1910,7 @@
       </p:sp>
       <p:sp>
         <p:nvSpPr>
-          <p:cNvPr id="117" name="Shape 117"/>
+          <p:cNvPr id="113" name="Shape 113"/>
           <p:cNvSpPr txBox="1"/>
           <p:nvPr>
             <p:ph idx="1" type="body"/>
@@ -1954,12 +1955,12 @@
 </p:notes>
 </file>
 
-<file path=ppt/notesSlides/notesSlide9.xml><?xml version="1.0" encoding="utf-8"?>
+<file path=ppt/notesSlides/notesSlide8.xml><?xml version="1.0" encoding="utf-8"?>
 <p:notes xmlns:a="http://schemas.openxmlformats.org/drawingml/2006/main" xmlns:r="http://schemas.openxmlformats.org/officeDocument/2006/relationships" xmlns:mc="http://schemas.openxmlformats.org/markup-compatibility/2006" xmlns:mv="urn:schemas-microsoft-com:mac:vml" xmlns:p="http://schemas.openxmlformats.org/presentationml/2006/main" xmlns:c="http://schemas.openxmlformats.org/drawingml/2006/chart" xmlns:dgm="http://schemas.openxmlformats.org/drawingml/2006/diagram" xmlns:o="urn:schemas-microsoft-com:office:office" xmlns:v="urn:schemas-microsoft-com:vml" xmlns:pvml="urn:schemas-microsoft-com:office:powerpoint" xmlns:com="http://schemas.openxmlformats.org/drawingml/2006/compatibility" xmlns:p14="http://schemas.microsoft.com/office/powerpoint/2010/main" xmlns:p15="http://schemas.microsoft.com/office/powerpoint/2012/main" showMasterPhAnim="0" showMasterSp="0">
   <p:cSld>
     <p:spTree>
       <p:nvGrpSpPr>
-        <p:cNvPr id="120" name="Shape 120"/>
+        <p:cNvPr id="116" name="Shape 116"/>
         <p:cNvGrpSpPr/>
         <p:nvPr/>
       </p:nvGrpSpPr>
@@ -1973,7 +1974,7 @@
       </p:grpSpPr>
       <p:sp>
         <p:nvSpPr>
-          <p:cNvPr id="121" name="Shape 121"/>
+          <p:cNvPr id="117" name="Shape 117"/>
           <p:cNvSpPr/>
           <p:nvPr>
             <p:ph idx="2" type="sldImg"/>
@@ -2007,7 +2008,105 @@
       </p:sp>
       <p:sp>
         <p:nvSpPr>
+          <p:cNvPr id="118" name="Shape 118"/>
+          <p:cNvSpPr txBox="1"/>
+          <p:nvPr>
+            <p:ph idx="1" type="body"/>
+          </p:nvPr>
+        </p:nvSpPr>
+        <p:spPr>
+          <a:xfrm>
+            <a:off x="685800" y="4343400"/>
+            <a:ext cx="5486400" cy="4114800"/>
+          </a:xfrm>
+          <a:prstGeom prst="rect">
+            <a:avLst/>
+          </a:prstGeom>
+        </p:spPr>
+        <p:txBody>
+          <a:bodyPr anchorCtr="0" anchor="t" bIns="91425" lIns="91425" spcFirstLastPara="1" rIns="91425" wrap="square" tIns="91425">
+            <a:noAutofit/>
+          </a:bodyPr>
+          <a:lstStyle/>
+          <a:p>
+            <a:pPr indent="0" lvl="0" marL="0">
+              <a:spcBef>
+                <a:spcPts val="0"/>
+              </a:spcBef>
+              <a:spcAft>
+                <a:spcPts val="0"/>
+              </a:spcAft>
+              <a:buNone/>
+            </a:pPr>
+            <a:r>
+              <a:t/>
+            </a:r>
+            <a:endParaRPr/>
+          </a:p>
+        </p:txBody>
+      </p:sp>
+    </p:spTree>
+  </p:cSld>
+  <p:clrMapOvr>
+    <a:masterClrMapping/>
+  </p:clrMapOvr>
+</p:notes>
+</file>
+
+<file path=ppt/notesSlides/notesSlide9.xml><?xml version="1.0" encoding="utf-8"?>
+<p:notes xmlns:a="http://schemas.openxmlformats.org/drawingml/2006/main" xmlns:r="http://schemas.openxmlformats.org/officeDocument/2006/relationships" xmlns:mc="http://schemas.openxmlformats.org/markup-compatibility/2006" xmlns:mv="urn:schemas-microsoft-com:mac:vml" xmlns:p="http://schemas.openxmlformats.org/presentationml/2006/main" xmlns:c="http://schemas.openxmlformats.org/drawingml/2006/chart" xmlns:dgm="http://schemas.openxmlformats.org/drawingml/2006/diagram" xmlns:o="urn:schemas-microsoft-com:office:office" xmlns:v="urn:schemas-microsoft-com:vml" xmlns:pvml="urn:schemas-microsoft-com:office:powerpoint" xmlns:com="http://schemas.openxmlformats.org/drawingml/2006/compatibility" xmlns:p14="http://schemas.microsoft.com/office/powerpoint/2010/main" xmlns:p15="http://schemas.microsoft.com/office/powerpoint/2012/main" showMasterPhAnim="0" showMasterSp="0">
+  <p:cSld>
+    <p:spTree>
+      <p:nvGrpSpPr>
+        <p:cNvPr id="121" name="Shape 121"/>
+        <p:cNvGrpSpPr/>
+        <p:nvPr/>
+      </p:nvGrpSpPr>
+      <p:grpSpPr>
+        <a:xfrm>
+          <a:off x="0" y="0"/>
+          <a:ext cx="0" cy="0"/>
+          <a:chOff x="0" y="0"/>
+          <a:chExt cx="0" cy="0"/>
+        </a:xfrm>
+      </p:grpSpPr>
+      <p:sp>
+        <p:nvSpPr>
           <p:cNvPr id="122" name="Shape 122"/>
+          <p:cNvSpPr/>
+          <p:nvPr>
+            <p:ph idx="2" type="sldImg"/>
+          </p:nvPr>
+        </p:nvSpPr>
+        <p:spPr>
+          <a:xfrm>
+            <a:off x="1143225" y="685800"/>
+            <a:ext cx="4572300" cy="3429000"/>
+          </a:xfrm>
+          <a:custGeom>
+            <a:pathLst>
+              <a:path extrusionOk="0" h="120000" w="120000">
+                <a:moveTo>
+                  <a:pt x="0" y="0"/>
+                </a:moveTo>
+                <a:lnTo>
+                  <a:pt x="120000" y="0"/>
+                </a:lnTo>
+                <a:lnTo>
+                  <a:pt x="120000" y="120000"/>
+                </a:lnTo>
+                <a:lnTo>
+                  <a:pt x="0" y="120000"/>
+                </a:lnTo>
+                <a:close/>
+              </a:path>
+            </a:pathLst>
+          </a:custGeom>
+        </p:spPr>
+      </p:sp>
+      <p:sp>
+        <p:nvSpPr>
+          <p:cNvPr id="123" name="Shape 123"/>
           <p:cNvSpPr txBox="1"/>
           <p:nvPr>
             <p:ph idx="1" type="body"/>
@@ -15767,9 +15866,252 @@
           <a:chExt cx="0" cy="0"/>
         </a:xfrm>
       </p:grpSpPr>
+      <p:sp>
+        <p:nvSpPr>
+          <p:cNvPr id="84" name="Shape 84"/>
+          <p:cNvSpPr txBox="1"/>
+          <p:nvPr>
+            <p:ph type="ctrTitle"/>
+          </p:nvPr>
+        </p:nvSpPr>
+        <p:spPr>
+          <a:xfrm>
+            <a:off x="1524000" y="545188"/>
+            <a:ext cx="9144000" cy="2387700"/>
+          </a:xfrm>
+          <a:prstGeom prst="rect">
+            <a:avLst/>
+          </a:prstGeom>
+        </p:spPr>
+        <p:txBody>
+          <a:bodyPr anchorCtr="0" anchor="b" bIns="91425" lIns="91425" spcFirstLastPara="1" rIns="91425" wrap="square" tIns="91425">
+            <a:noAutofit/>
+          </a:bodyPr>
+          <a:lstStyle/>
+          <a:p>
+            <a:pPr indent="0" lvl="0" marL="0">
+              <a:spcBef>
+                <a:spcPts val="0"/>
+              </a:spcBef>
+              <a:spcAft>
+                <a:spcPts val="0"/>
+              </a:spcAft>
+              <a:buNone/>
+            </a:pPr>
+            <a:r>
+              <a:rPr lang="en-US"/>
+              <a:t>Sistema Dionísio</a:t>
+            </a:r>
+            <a:endParaRPr/>
+          </a:p>
+          <a:p>
+            <a:pPr indent="0" lvl="0" marL="0">
+              <a:spcBef>
+                <a:spcPts val="0"/>
+              </a:spcBef>
+              <a:spcAft>
+                <a:spcPts val="0"/>
+              </a:spcAft>
+              <a:buNone/>
+            </a:pPr>
+            <a:r>
+              <a:rPr lang="en-US"/>
+              <a:t>Projeto de COO</a:t>
+            </a:r>
+            <a:endParaRPr/>
+          </a:p>
+        </p:txBody>
+      </p:sp>
+      <p:sp>
+        <p:nvSpPr>
+          <p:cNvPr id="85" name="Shape 85"/>
+          <p:cNvSpPr txBox="1"/>
+          <p:nvPr>
+            <p:ph idx="1" type="subTitle"/>
+          </p:nvPr>
+        </p:nvSpPr>
+        <p:spPr>
+          <a:xfrm>
+            <a:off x="1524000" y="3177687"/>
+            <a:ext cx="9144000" cy="3255900"/>
+          </a:xfrm>
+          <a:prstGeom prst="rect">
+            <a:avLst/>
+          </a:prstGeom>
+        </p:spPr>
+        <p:txBody>
+          <a:bodyPr anchorCtr="0" anchor="t" bIns="91425" lIns="91425" spcFirstLastPara="1" rIns="91425" wrap="square" tIns="91425">
+            <a:noAutofit/>
+          </a:bodyPr>
+          <a:lstStyle/>
+          <a:p>
+            <a:pPr indent="0" lvl="0" marL="0">
+              <a:spcBef>
+                <a:spcPts val="1000"/>
+              </a:spcBef>
+              <a:spcAft>
+                <a:spcPts val="0"/>
+              </a:spcAft>
+              <a:buNone/>
+            </a:pPr>
+            <a:r>
+              <a:rPr lang="en-US"/>
+              <a:t>COO - ACH2003 - 2018 - Manhã:</a:t>
+            </a:r>
+            <a:endParaRPr/>
+          </a:p>
+          <a:p>
+            <a:pPr indent="457200" lvl="0" marL="1371600" algn="l">
+              <a:spcBef>
+                <a:spcPts val="1000"/>
+              </a:spcBef>
+              <a:spcAft>
+                <a:spcPts val="0"/>
+              </a:spcAft>
+              <a:buNone/>
+            </a:pPr>
+            <a:r>
+              <a:rPr lang="en-US"/>
+              <a:t>  </a:t>
+            </a:r>
+            <a:r>
+              <a:rPr lang="en-US"/>
+              <a:t>10430962 - Denise Keiko Ferreira Adati</a:t>
+            </a:r>
+            <a:endParaRPr/>
+          </a:p>
+          <a:p>
+            <a:pPr indent="0" lvl="0" marL="0">
+              <a:spcBef>
+                <a:spcPts val="1000"/>
+              </a:spcBef>
+              <a:spcAft>
+                <a:spcPts val="0"/>
+              </a:spcAft>
+              <a:buNone/>
+            </a:pPr>
+            <a:r>
+              <a:rPr lang="en-US"/>
+              <a:t>10258772 - Lucas Pereira Castelo Branco</a:t>
+            </a:r>
+            <a:endParaRPr/>
+          </a:p>
+          <a:p>
+            <a:pPr indent="0" lvl="0" marL="0">
+              <a:spcBef>
+                <a:spcPts val="1000"/>
+              </a:spcBef>
+              <a:spcAft>
+                <a:spcPts val="0"/>
+              </a:spcAft>
+              <a:buNone/>
+            </a:pPr>
+            <a:r>
+              <a:rPr lang="en-US"/>
+              <a:t>9788030 - Gabriela Brindo Domingues</a:t>
+            </a:r>
+            <a:endParaRPr/>
+          </a:p>
+          <a:p>
+            <a:pPr indent="0" lvl="0" marL="0" rtl="0">
+              <a:spcBef>
+                <a:spcPts val="1000"/>
+              </a:spcBef>
+              <a:spcAft>
+                <a:spcPts val="0"/>
+              </a:spcAft>
+              <a:buNone/>
+            </a:pPr>
+            <a:r>
+              <a:rPr lang="en-US"/>
+              <a:t>9877933</a:t>
+            </a:r>
+            <a:r>
+              <a:rPr lang="en-US"/>
+              <a:t> - </a:t>
+            </a:r>
+            <a:r>
+              <a:rPr lang="en-US"/>
+              <a:t>Lucas Perez Chabariberi</a:t>
+            </a:r>
+            <a:endParaRPr/>
+          </a:p>
+          <a:p>
+            <a:pPr indent="0" lvl="0" marL="0">
+              <a:spcBef>
+                <a:spcPts val="1000"/>
+              </a:spcBef>
+              <a:spcAft>
+                <a:spcPts val="0"/>
+              </a:spcAft>
+              <a:buNone/>
+            </a:pPr>
+            <a:r>
+              <a:rPr lang="en-US"/>
+              <a:t>10259046 - Samuel Silva Caetite</a:t>
+            </a:r>
+            <a:endParaRPr/>
+          </a:p>
+          <a:p>
+            <a:pPr indent="0" lvl="0" marL="0" rtl="0">
+              <a:spcBef>
+                <a:spcPts val="1000"/>
+              </a:spcBef>
+              <a:spcAft>
+                <a:spcPts val="0"/>
+              </a:spcAft>
+              <a:buNone/>
+            </a:pPr>
+            <a:r>
+              <a:t/>
+            </a:r>
+            <a:endParaRPr/>
+          </a:p>
+          <a:p>
+            <a:pPr indent="0" lvl="0" marL="0" algn="l">
+              <a:spcBef>
+                <a:spcPts val="1000"/>
+              </a:spcBef>
+              <a:spcAft>
+                <a:spcPts val="0"/>
+              </a:spcAft>
+              <a:buNone/>
+            </a:pPr>
+            <a:r>
+              <a:t/>
+            </a:r>
+            <a:endParaRPr/>
+          </a:p>
+        </p:txBody>
+      </p:sp>
+    </p:spTree>
+  </p:cSld>
+  <p:clrMapOvr>
+    <a:masterClrMapping/>
+  </p:clrMapOvr>
+</p:sld>
+</file>
+
+<file path=ppt/slides/slide10.xml><?xml version="1.0" encoding="utf-8"?>
+<p:sld xmlns:a="http://schemas.openxmlformats.org/drawingml/2006/main" xmlns:r="http://schemas.openxmlformats.org/officeDocument/2006/relationships" xmlns:mc="http://schemas.openxmlformats.org/markup-compatibility/2006" xmlns:mv="urn:schemas-microsoft-com:mac:vml" xmlns:p="http://schemas.openxmlformats.org/presentationml/2006/main" xmlns:c="http://schemas.openxmlformats.org/drawingml/2006/chart" xmlns:dgm="http://schemas.openxmlformats.org/drawingml/2006/diagram" xmlns:o="urn:schemas-microsoft-com:office:office" xmlns:v="urn:schemas-microsoft-com:vml" xmlns:pvml="urn:schemas-microsoft-com:office:powerpoint" xmlns:com="http://schemas.openxmlformats.org/drawingml/2006/compatibility" xmlns:p14="http://schemas.microsoft.com/office/powerpoint/2010/main" xmlns:p15="http://schemas.microsoft.com/office/powerpoint/2012/main">
+  <p:cSld>
+    <p:spTree>
+      <p:nvGrpSpPr>
+        <p:cNvPr id="129" name="Shape 129"/>
+        <p:cNvGrpSpPr/>
+        <p:nvPr/>
+      </p:nvGrpSpPr>
+      <p:grpSpPr>
+        <a:xfrm>
+          <a:off x="0" y="0"/>
+          <a:ext cx="0" cy="0"/>
+          <a:chOff x="0" y="0"/>
+          <a:chExt cx="0" cy="0"/>
+        </a:xfrm>
+      </p:grpSpPr>
       <p:pic>
         <p:nvPicPr>
-          <p:cNvPr id="84" name="Shape 84"/>
+          <p:cNvPr id="130" name="Shape 130"/>
           <p:cNvPicPr preferRelativeResize="0"/>
           <p:nvPr/>
         </p:nvPicPr>
@@ -15783,8 +16125,8 @@
         </p:blipFill>
         <p:spPr>
           <a:xfrm>
-            <a:off x="2861800" y="736426"/>
-            <a:ext cx="6780149" cy="5725175"/>
+            <a:off x="3859076" y="1017562"/>
+            <a:ext cx="4473850" cy="4822875"/>
           </a:xfrm>
           <a:prstGeom prst="rect">
             <a:avLst/>
@@ -15803,12 +16145,12 @@
 </p:sld>
 </file>
 
-<file path=ppt/slides/slide10.xml><?xml version="1.0" encoding="utf-8"?>
+<file path=ppt/slides/slide11.xml><?xml version="1.0" encoding="utf-8"?>
 <p:sld xmlns:a="http://schemas.openxmlformats.org/drawingml/2006/main" xmlns:r="http://schemas.openxmlformats.org/officeDocument/2006/relationships" xmlns:mc="http://schemas.openxmlformats.org/markup-compatibility/2006" xmlns:mv="urn:schemas-microsoft-com:mac:vml" xmlns:p="http://schemas.openxmlformats.org/presentationml/2006/main" xmlns:c="http://schemas.openxmlformats.org/drawingml/2006/chart" xmlns:dgm="http://schemas.openxmlformats.org/drawingml/2006/diagram" xmlns:o="urn:schemas-microsoft-com:office:office" xmlns:v="urn:schemas-microsoft-com:vml" xmlns:pvml="urn:schemas-microsoft-com:office:powerpoint" xmlns:com="http://schemas.openxmlformats.org/drawingml/2006/compatibility" xmlns:p14="http://schemas.microsoft.com/office/powerpoint/2010/main" xmlns:p15="http://schemas.microsoft.com/office/powerpoint/2012/main">
   <p:cSld>
     <p:spTree>
       <p:nvGrpSpPr>
-        <p:cNvPr id="128" name="Shape 128"/>
+        <p:cNvPr id="134" name="Shape 134"/>
         <p:cNvGrpSpPr/>
         <p:nvPr/>
       </p:nvGrpSpPr>
@@ -15822,7 +16164,7 @@
       </p:grpSpPr>
       <p:pic>
         <p:nvPicPr>
-          <p:cNvPr id="129" name="Shape 129"/>
+          <p:cNvPr id="135" name="Shape 135"/>
           <p:cNvPicPr preferRelativeResize="0"/>
           <p:nvPr/>
         </p:nvPicPr>
@@ -15856,12 +16198,12 @@
 </p:sld>
 </file>
 
-<file path=ppt/slides/slide11.xml><?xml version="1.0" encoding="utf-8"?>
+<file path=ppt/slides/slide12.xml><?xml version="1.0" encoding="utf-8"?>
 <p:sld xmlns:a="http://schemas.openxmlformats.org/drawingml/2006/main" xmlns:r="http://schemas.openxmlformats.org/officeDocument/2006/relationships" xmlns:mc="http://schemas.openxmlformats.org/markup-compatibility/2006" xmlns:mv="urn:schemas-microsoft-com:mac:vml" xmlns:p="http://schemas.openxmlformats.org/presentationml/2006/main" xmlns:c="http://schemas.openxmlformats.org/drawingml/2006/chart" xmlns:dgm="http://schemas.openxmlformats.org/drawingml/2006/diagram" xmlns:o="urn:schemas-microsoft-com:office:office" xmlns:v="urn:schemas-microsoft-com:vml" xmlns:pvml="urn:schemas-microsoft-com:office:powerpoint" xmlns:com="http://schemas.openxmlformats.org/drawingml/2006/compatibility" xmlns:p14="http://schemas.microsoft.com/office/powerpoint/2010/main" xmlns:p15="http://schemas.microsoft.com/office/powerpoint/2012/main">
   <p:cSld>
     <p:spTree>
       <p:nvGrpSpPr>
-        <p:cNvPr id="133" name="Shape 133"/>
+        <p:cNvPr id="139" name="Shape 139"/>
         <p:cNvGrpSpPr/>
         <p:nvPr/>
       </p:nvGrpSpPr>
@@ -15875,7 +16217,7 @@
       </p:grpSpPr>
       <p:pic>
         <p:nvPicPr>
-          <p:cNvPr id="134" name="Shape 134"/>
+          <p:cNvPr id="140" name="Shape 140"/>
           <p:cNvPicPr preferRelativeResize="0"/>
           <p:nvPr/>
         </p:nvPicPr>
@@ -15909,12 +16251,12 @@
 </p:sld>
 </file>
 
-<file path=ppt/slides/slide12.xml><?xml version="1.0" encoding="utf-8"?>
+<file path=ppt/slides/slide13.xml><?xml version="1.0" encoding="utf-8"?>
 <p:sld xmlns:a="http://schemas.openxmlformats.org/drawingml/2006/main" xmlns:r="http://schemas.openxmlformats.org/officeDocument/2006/relationships" xmlns:mc="http://schemas.openxmlformats.org/markup-compatibility/2006" xmlns:mv="urn:schemas-microsoft-com:mac:vml" xmlns:p="http://schemas.openxmlformats.org/presentationml/2006/main" xmlns:c="http://schemas.openxmlformats.org/drawingml/2006/chart" xmlns:dgm="http://schemas.openxmlformats.org/drawingml/2006/diagram" xmlns:o="urn:schemas-microsoft-com:office:office" xmlns:v="urn:schemas-microsoft-com:vml" xmlns:pvml="urn:schemas-microsoft-com:office:powerpoint" xmlns:com="http://schemas.openxmlformats.org/drawingml/2006/compatibility" xmlns:p14="http://schemas.microsoft.com/office/powerpoint/2010/main" xmlns:p15="http://schemas.microsoft.com/office/powerpoint/2012/main">
   <p:cSld>
     <p:spTree>
       <p:nvGrpSpPr>
-        <p:cNvPr id="138" name="Shape 138"/>
+        <p:cNvPr id="144" name="Shape 144"/>
         <p:cNvGrpSpPr/>
         <p:nvPr/>
       </p:nvGrpSpPr>
@@ -15928,7 +16270,7 @@
       </p:grpSpPr>
       <p:pic>
         <p:nvPicPr>
-          <p:cNvPr id="139" name="Shape 139"/>
+          <p:cNvPr id="145" name="Shape 145"/>
           <p:cNvPicPr preferRelativeResize="0"/>
           <p:nvPr/>
         </p:nvPicPr>
@@ -15962,12 +16304,12 @@
 </p:sld>
 </file>
 
-<file path=ppt/slides/slide13.xml><?xml version="1.0" encoding="utf-8"?>
+<file path=ppt/slides/slide14.xml><?xml version="1.0" encoding="utf-8"?>
 <p:sld xmlns:a="http://schemas.openxmlformats.org/drawingml/2006/main" xmlns:r="http://schemas.openxmlformats.org/officeDocument/2006/relationships" xmlns:mc="http://schemas.openxmlformats.org/markup-compatibility/2006" xmlns:mv="urn:schemas-microsoft-com:mac:vml" xmlns:p="http://schemas.openxmlformats.org/presentationml/2006/main" xmlns:c="http://schemas.openxmlformats.org/drawingml/2006/chart" xmlns:dgm="http://schemas.openxmlformats.org/drawingml/2006/diagram" xmlns:o="urn:schemas-microsoft-com:office:office" xmlns:v="urn:schemas-microsoft-com:vml" xmlns:pvml="urn:schemas-microsoft-com:office:powerpoint" xmlns:com="http://schemas.openxmlformats.org/drawingml/2006/compatibility" xmlns:p14="http://schemas.microsoft.com/office/powerpoint/2010/main" xmlns:p15="http://schemas.microsoft.com/office/powerpoint/2012/main">
   <p:cSld>
     <p:spTree>
       <p:nvGrpSpPr>
-        <p:cNvPr id="143" name="Shape 143"/>
+        <p:cNvPr id="149" name="Shape 149"/>
         <p:cNvGrpSpPr/>
         <p:nvPr/>
       </p:nvGrpSpPr>
@@ -15981,7 +16323,7 @@
       </p:grpSpPr>
       <p:pic>
         <p:nvPicPr>
-          <p:cNvPr id="144" name="Shape 144"/>
+          <p:cNvPr id="150" name="Shape 150"/>
           <p:cNvPicPr preferRelativeResize="0"/>
           <p:nvPr/>
         </p:nvPicPr>
@@ -16015,12 +16357,12 @@
 </p:sld>
 </file>
 
-<file path=ppt/slides/slide14.xml><?xml version="1.0" encoding="utf-8"?>
+<file path=ppt/slides/slide15.xml><?xml version="1.0" encoding="utf-8"?>
 <p:sld xmlns:a="http://schemas.openxmlformats.org/drawingml/2006/main" xmlns:r="http://schemas.openxmlformats.org/officeDocument/2006/relationships" xmlns:mc="http://schemas.openxmlformats.org/markup-compatibility/2006" xmlns:mv="urn:schemas-microsoft-com:mac:vml" xmlns:p="http://schemas.openxmlformats.org/presentationml/2006/main" xmlns:c="http://schemas.openxmlformats.org/drawingml/2006/chart" xmlns:dgm="http://schemas.openxmlformats.org/drawingml/2006/diagram" xmlns:o="urn:schemas-microsoft-com:office:office" xmlns:v="urn:schemas-microsoft-com:vml" xmlns:pvml="urn:schemas-microsoft-com:office:powerpoint" xmlns:com="http://schemas.openxmlformats.org/drawingml/2006/compatibility" xmlns:p14="http://schemas.microsoft.com/office/powerpoint/2010/main" xmlns:p15="http://schemas.microsoft.com/office/powerpoint/2012/main">
   <p:cSld>
     <p:spTree>
       <p:nvGrpSpPr>
-        <p:cNvPr id="148" name="Shape 148"/>
+        <p:cNvPr id="154" name="Shape 154"/>
         <p:cNvGrpSpPr/>
         <p:nvPr/>
       </p:nvGrpSpPr>
@@ -16034,7 +16376,7 @@
       </p:grpSpPr>
       <p:pic>
         <p:nvPicPr>
-          <p:cNvPr id="149" name="Shape 149"/>
+          <p:cNvPr id="155" name="Shape 155"/>
           <p:cNvPicPr preferRelativeResize="0"/>
           <p:nvPr/>
         </p:nvPicPr>
@@ -16073,7 +16415,7 @@
   <p:cSld>
     <p:spTree>
       <p:nvGrpSpPr>
-        <p:cNvPr id="88" name="Shape 88"/>
+        <p:cNvPr id="89" name="Shape 89"/>
         <p:cNvGrpSpPr/>
         <p:nvPr/>
       </p:nvGrpSpPr>
@@ -16087,7 +16429,60 @@
       </p:grpSpPr>
       <p:pic>
         <p:nvPicPr>
-          <p:cNvPr id="89" name="Shape 89"/>
+          <p:cNvPr id="90" name="Shape 90"/>
+          <p:cNvPicPr preferRelativeResize="0"/>
+          <p:nvPr/>
+        </p:nvPicPr>
+        <p:blipFill>
+          <a:blip r:embed="rId3">
+            <a:alphaModFix/>
+          </a:blip>
+          <a:stretch>
+            <a:fillRect/>
+          </a:stretch>
+        </p:blipFill>
+        <p:spPr>
+          <a:xfrm>
+            <a:off x="2861800" y="736426"/>
+            <a:ext cx="6780149" cy="5725175"/>
+          </a:xfrm>
+          <a:prstGeom prst="rect">
+            <a:avLst/>
+          </a:prstGeom>
+          <a:noFill/>
+          <a:ln>
+            <a:noFill/>
+          </a:ln>
+        </p:spPr>
+      </p:pic>
+    </p:spTree>
+  </p:cSld>
+  <p:clrMapOvr>
+    <a:masterClrMapping/>
+  </p:clrMapOvr>
+</p:sld>
+</file>
+
+<file path=ppt/slides/slide3.xml><?xml version="1.0" encoding="utf-8"?>
+<p:sld xmlns:a="http://schemas.openxmlformats.org/drawingml/2006/main" xmlns:r="http://schemas.openxmlformats.org/officeDocument/2006/relationships" xmlns:mc="http://schemas.openxmlformats.org/markup-compatibility/2006" xmlns:mv="urn:schemas-microsoft-com:mac:vml" xmlns:p="http://schemas.openxmlformats.org/presentationml/2006/main" xmlns:c="http://schemas.openxmlformats.org/drawingml/2006/chart" xmlns:dgm="http://schemas.openxmlformats.org/drawingml/2006/diagram" xmlns:o="urn:schemas-microsoft-com:office:office" xmlns:v="urn:schemas-microsoft-com:vml" xmlns:pvml="urn:schemas-microsoft-com:office:powerpoint" xmlns:com="http://schemas.openxmlformats.org/drawingml/2006/compatibility" xmlns:p14="http://schemas.microsoft.com/office/powerpoint/2010/main" xmlns:p15="http://schemas.microsoft.com/office/powerpoint/2012/main">
+  <p:cSld>
+    <p:spTree>
+      <p:nvGrpSpPr>
+        <p:cNvPr id="94" name="Shape 94"/>
+        <p:cNvGrpSpPr/>
+        <p:nvPr/>
+      </p:nvGrpSpPr>
+      <p:grpSpPr>
+        <a:xfrm>
+          <a:off x="0" y="0"/>
+          <a:ext cx="0" cy="0"/>
+          <a:chOff x="0" y="0"/>
+          <a:chExt cx="0" cy="0"/>
+        </a:xfrm>
+      </p:grpSpPr>
+      <p:pic>
+        <p:nvPicPr>
+          <p:cNvPr id="95" name="Shape 95"/>
           <p:cNvPicPr preferRelativeResize="0"/>
           <p:nvPr/>
         </p:nvPicPr>
@@ -16121,12 +16516,12 @@
 </p:sld>
 </file>
 
-<file path=ppt/slides/slide3.xml><?xml version="1.0" encoding="utf-8"?>
+<file path=ppt/slides/slide4.xml><?xml version="1.0" encoding="utf-8"?>
 <p:sld xmlns:a="http://schemas.openxmlformats.org/drawingml/2006/main" xmlns:r="http://schemas.openxmlformats.org/officeDocument/2006/relationships" xmlns:mc="http://schemas.openxmlformats.org/markup-compatibility/2006" xmlns:mv="urn:schemas-microsoft-com:mac:vml" xmlns:p="http://schemas.openxmlformats.org/presentationml/2006/main" xmlns:c="http://schemas.openxmlformats.org/drawingml/2006/chart" xmlns:dgm="http://schemas.openxmlformats.org/drawingml/2006/diagram" xmlns:o="urn:schemas-microsoft-com:office:office" xmlns:v="urn:schemas-microsoft-com:vml" xmlns:pvml="urn:schemas-microsoft-com:office:powerpoint" xmlns:com="http://schemas.openxmlformats.org/drawingml/2006/compatibility" xmlns:p14="http://schemas.microsoft.com/office/powerpoint/2010/main" xmlns:p15="http://schemas.microsoft.com/office/powerpoint/2012/main">
   <p:cSld>
     <p:spTree>
       <p:nvGrpSpPr>
-        <p:cNvPr id="93" name="Shape 93"/>
+        <p:cNvPr id="99" name="Shape 99"/>
         <p:cNvGrpSpPr/>
         <p:nvPr/>
       </p:nvGrpSpPr>
@@ -16140,7 +16535,7 @@
       </p:grpSpPr>
       <p:pic>
         <p:nvPicPr>
-          <p:cNvPr id="94" name="Shape 94"/>
+          <p:cNvPr id="100" name="Shape 100"/>
           <p:cNvPicPr preferRelativeResize="0"/>
           <p:nvPr/>
         </p:nvPicPr>
@@ -16174,12 +16569,12 @@
 </p:sld>
 </file>
 
-<file path=ppt/slides/slide4.xml><?xml version="1.0" encoding="utf-8"?>
+<file path=ppt/slides/slide5.xml><?xml version="1.0" encoding="utf-8"?>
 <p:sld xmlns:a="http://schemas.openxmlformats.org/drawingml/2006/main" xmlns:r="http://schemas.openxmlformats.org/officeDocument/2006/relationships" xmlns:mc="http://schemas.openxmlformats.org/markup-compatibility/2006" xmlns:mv="urn:schemas-microsoft-com:mac:vml" xmlns:p="http://schemas.openxmlformats.org/presentationml/2006/main" xmlns:c="http://schemas.openxmlformats.org/drawingml/2006/chart" xmlns:dgm="http://schemas.openxmlformats.org/drawingml/2006/diagram" xmlns:o="urn:schemas-microsoft-com:office:office" xmlns:v="urn:schemas-microsoft-com:vml" xmlns:pvml="urn:schemas-microsoft-com:office:powerpoint" xmlns:com="http://schemas.openxmlformats.org/drawingml/2006/compatibility" xmlns:p14="http://schemas.microsoft.com/office/powerpoint/2010/main" xmlns:p15="http://schemas.microsoft.com/office/powerpoint/2012/main">
   <p:cSld>
     <p:spTree>
       <p:nvGrpSpPr>
-        <p:cNvPr id="98" name="Shape 98"/>
+        <p:cNvPr id="104" name="Shape 104"/>
         <p:cNvGrpSpPr/>
         <p:nvPr/>
       </p:nvGrpSpPr>
@@ -16193,7 +16588,7 @@
       </p:grpSpPr>
       <p:pic>
         <p:nvPicPr>
-          <p:cNvPr id="99" name="Shape 99"/>
+          <p:cNvPr id="105" name="Shape 105"/>
           <p:cNvPicPr preferRelativeResize="0"/>
           <p:nvPr/>
         </p:nvPicPr>
@@ -16227,12 +16622,12 @@
 </p:sld>
 </file>
 
-<file path=ppt/slides/slide5.xml><?xml version="1.0" encoding="utf-8"?>
+<file path=ppt/slides/slide6.xml><?xml version="1.0" encoding="utf-8"?>
 <p:sld xmlns:a="http://schemas.openxmlformats.org/drawingml/2006/main" xmlns:r="http://schemas.openxmlformats.org/officeDocument/2006/relationships" xmlns:mc="http://schemas.openxmlformats.org/markup-compatibility/2006" xmlns:mv="urn:schemas-microsoft-com:mac:vml" xmlns:p="http://schemas.openxmlformats.org/presentationml/2006/main" xmlns:c="http://schemas.openxmlformats.org/drawingml/2006/chart" xmlns:dgm="http://schemas.openxmlformats.org/drawingml/2006/diagram" xmlns:o="urn:schemas-microsoft-com:office:office" xmlns:v="urn:schemas-microsoft-com:vml" xmlns:pvml="urn:schemas-microsoft-com:office:powerpoint" xmlns:com="http://schemas.openxmlformats.org/drawingml/2006/compatibility" xmlns:p14="http://schemas.microsoft.com/office/powerpoint/2010/main" xmlns:p15="http://schemas.microsoft.com/office/powerpoint/2012/main">
   <p:cSld>
     <p:spTree>
       <p:nvGrpSpPr>
-        <p:cNvPr id="103" name="Shape 103"/>
+        <p:cNvPr id="109" name="Shape 109"/>
         <p:cNvGrpSpPr/>
         <p:nvPr/>
       </p:nvGrpSpPr>
@@ -16246,7 +16641,7 @@
       </p:grpSpPr>
       <p:pic>
         <p:nvPicPr>
-          <p:cNvPr id="104" name="Shape 104"/>
+          <p:cNvPr id="110" name="Shape 110"/>
           <p:cNvPicPr preferRelativeResize="0"/>
           <p:nvPr/>
         </p:nvPicPr>
@@ -16280,12 +16675,12 @@
 </p:sld>
 </file>
 
-<file path=ppt/slides/slide6.xml><?xml version="1.0" encoding="utf-8"?>
+<file path=ppt/slides/slide7.xml><?xml version="1.0" encoding="utf-8"?>
 <p:sld xmlns:a="http://schemas.openxmlformats.org/drawingml/2006/main" xmlns:r="http://schemas.openxmlformats.org/officeDocument/2006/relationships" xmlns:mc="http://schemas.openxmlformats.org/markup-compatibility/2006" xmlns:mv="urn:schemas-microsoft-com:mac:vml" xmlns:p="http://schemas.openxmlformats.org/presentationml/2006/main" xmlns:c="http://schemas.openxmlformats.org/drawingml/2006/chart" xmlns:dgm="http://schemas.openxmlformats.org/drawingml/2006/diagram" xmlns:o="urn:schemas-microsoft-com:office:office" xmlns:v="urn:schemas-microsoft-com:vml" xmlns:pvml="urn:schemas-microsoft-com:office:powerpoint" xmlns:com="http://schemas.openxmlformats.org/drawingml/2006/compatibility" xmlns:p14="http://schemas.microsoft.com/office/powerpoint/2010/main" xmlns:p15="http://schemas.microsoft.com/office/powerpoint/2012/main">
   <p:cSld>
     <p:spTree>
       <p:nvGrpSpPr>
-        <p:cNvPr id="108" name="Shape 108"/>
+        <p:cNvPr id="114" name="Shape 114"/>
         <p:cNvGrpSpPr/>
         <p:nvPr/>
       </p:nvGrpSpPr>
@@ -16299,7 +16694,7 @@
       </p:grpSpPr>
       <p:pic>
         <p:nvPicPr>
-          <p:cNvPr id="109" name="Shape 109"/>
+          <p:cNvPr id="115" name="Shape 115"/>
           <p:cNvPicPr preferRelativeResize="0"/>
           <p:nvPr/>
         </p:nvPicPr>
@@ -16333,12 +16728,12 @@
 </p:sld>
 </file>
 
-<file path=ppt/slides/slide7.xml><?xml version="1.0" encoding="utf-8"?>
+<file path=ppt/slides/slide8.xml><?xml version="1.0" encoding="utf-8"?>
 <p:sld xmlns:a="http://schemas.openxmlformats.org/drawingml/2006/main" xmlns:r="http://schemas.openxmlformats.org/officeDocument/2006/relationships" xmlns:mc="http://schemas.openxmlformats.org/markup-compatibility/2006" xmlns:mv="urn:schemas-microsoft-com:mac:vml" xmlns:p="http://schemas.openxmlformats.org/presentationml/2006/main" xmlns:c="http://schemas.openxmlformats.org/drawingml/2006/chart" xmlns:dgm="http://schemas.openxmlformats.org/drawingml/2006/diagram" xmlns:o="urn:schemas-microsoft-com:office:office" xmlns:v="urn:schemas-microsoft-com:vml" xmlns:pvml="urn:schemas-microsoft-com:office:powerpoint" xmlns:com="http://schemas.openxmlformats.org/drawingml/2006/compatibility" xmlns:p14="http://schemas.microsoft.com/office/powerpoint/2010/main" xmlns:p15="http://schemas.microsoft.com/office/powerpoint/2012/main">
   <p:cSld>
     <p:spTree>
       <p:nvGrpSpPr>
-        <p:cNvPr id="113" name="Shape 113"/>
+        <p:cNvPr id="119" name="Shape 119"/>
         <p:cNvGrpSpPr/>
         <p:nvPr/>
       </p:nvGrpSpPr>
@@ -16352,7 +16747,7 @@
       </p:grpSpPr>
       <p:pic>
         <p:nvPicPr>
-          <p:cNvPr id="114" name="Shape 114"/>
+          <p:cNvPr id="120" name="Shape 120"/>
           <p:cNvPicPr preferRelativeResize="0"/>
           <p:nvPr/>
         </p:nvPicPr>
@@ -16386,12 +16781,12 @@
 </p:sld>
 </file>
 
-<file path=ppt/slides/slide8.xml><?xml version="1.0" encoding="utf-8"?>
+<file path=ppt/slides/slide9.xml><?xml version="1.0" encoding="utf-8"?>
 <p:sld xmlns:a="http://schemas.openxmlformats.org/drawingml/2006/main" xmlns:r="http://schemas.openxmlformats.org/officeDocument/2006/relationships" xmlns:mc="http://schemas.openxmlformats.org/markup-compatibility/2006" xmlns:mv="urn:schemas-microsoft-com:mac:vml" xmlns:p="http://schemas.openxmlformats.org/presentationml/2006/main" xmlns:c="http://schemas.openxmlformats.org/drawingml/2006/chart" xmlns:dgm="http://schemas.openxmlformats.org/drawingml/2006/diagram" xmlns:o="urn:schemas-microsoft-com:office:office" xmlns:v="urn:schemas-microsoft-com:vml" xmlns:pvml="urn:schemas-microsoft-com:office:powerpoint" xmlns:com="http://schemas.openxmlformats.org/drawingml/2006/compatibility" xmlns:p14="http://schemas.microsoft.com/office/powerpoint/2010/main" xmlns:p15="http://schemas.microsoft.com/office/powerpoint/2012/main">
   <p:cSld>
     <p:spTree>
       <p:nvGrpSpPr>
-        <p:cNvPr id="118" name="Shape 118"/>
+        <p:cNvPr id="124" name="Shape 124"/>
         <p:cNvGrpSpPr/>
         <p:nvPr/>
       </p:nvGrpSpPr>
@@ -16405,7 +16800,7 @@
       </p:grpSpPr>
       <p:pic>
         <p:nvPicPr>
-          <p:cNvPr id="119" name="Shape 119"/>
+          <p:cNvPr id="125" name="Shape 125"/>
           <p:cNvPicPr preferRelativeResize="0"/>
           <p:nvPr/>
         </p:nvPicPr>
@@ -16421,59 +16816,6 @@
           <a:xfrm>
             <a:off x="3096213" y="750975"/>
             <a:ext cx="5999575" cy="5100975"/>
-          </a:xfrm>
-          <a:prstGeom prst="rect">
-            <a:avLst/>
-          </a:prstGeom>
-          <a:noFill/>
-          <a:ln>
-            <a:noFill/>
-          </a:ln>
-        </p:spPr>
-      </p:pic>
-    </p:spTree>
-  </p:cSld>
-  <p:clrMapOvr>
-    <a:masterClrMapping/>
-  </p:clrMapOvr>
-</p:sld>
-</file>
-
-<file path=ppt/slides/slide9.xml><?xml version="1.0" encoding="utf-8"?>
-<p:sld xmlns:a="http://schemas.openxmlformats.org/drawingml/2006/main" xmlns:r="http://schemas.openxmlformats.org/officeDocument/2006/relationships" xmlns:mc="http://schemas.openxmlformats.org/markup-compatibility/2006" xmlns:mv="urn:schemas-microsoft-com:mac:vml" xmlns:p="http://schemas.openxmlformats.org/presentationml/2006/main" xmlns:c="http://schemas.openxmlformats.org/drawingml/2006/chart" xmlns:dgm="http://schemas.openxmlformats.org/drawingml/2006/diagram" xmlns:o="urn:schemas-microsoft-com:office:office" xmlns:v="urn:schemas-microsoft-com:vml" xmlns:pvml="urn:schemas-microsoft-com:office:powerpoint" xmlns:com="http://schemas.openxmlformats.org/drawingml/2006/compatibility" xmlns:p14="http://schemas.microsoft.com/office/powerpoint/2010/main" xmlns:p15="http://schemas.microsoft.com/office/powerpoint/2012/main">
-  <p:cSld>
-    <p:spTree>
-      <p:nvGrpSpPr>
-        <p:cNvPr id="123" name="Shape 123"/>
-        <p:cNvGrpSpPr/>
-        <p:nvPr/>
-      </p:nvGrpSpPr>
-      <p:grpSpPr>
-        <a:xfrm>
-          <a:off x="0" y="0"/>
-          <a:ext cx="0" cy="0"/>
-          <a:chOff x="0" y="0"/>
-          <a:chExt cx="0" cy="0"/>
-        </a:xfrm>
-      </p:grpSpPr>
-      <p:pic>
-        <p:nvPicPr>
-          <p:cNvPr id="124" name="Shape 124"/>
-          <p:cNvPicPr preferRelativeResize="0"/>
-          <p:nvPr/>
-        </p:nvPicPr>
-        <p:blipFill>
-          <a:blip r:embed="rId3">
-            <a:alphaModFix/>
-          </a:blip>
-          <a:stretch>
-            <a:fillRect/>
-          </a:stretch>
-        </p:blipFill>
-        <p:spPr>
-          <a:xfrm>
-            <a:off x="3859076" y="1017562"/>
-            <a:ext cx="4473850" cy="4822875"/>
           </a:xfrm>
           <a:prstGeom prst="rect">
             <a:avLst/>

</xml_diff>

<commit_message>
Atualização dos .pdf e p
</commit_message>
<xml_diff>
--- a/Telas-DIONISIO.pptx
+++ b/Telas-DIONISIO.pptx
@@ -15932,8 +15932,8 @@
         </p:nvSpPr>
         <p:spPr>
           <a:xfrm>
-            <a:off x="1524000" y="3177687"/>
-            <a:ext cx="9144000" cy="3255900"/>
+            <a:off x="1524000" y="2850323"/>
+            <a:ext cx="9144000" cy="3843900"/>
           </a:xfrm>
           <a:prstGeom prst="rect">
             <a:avLst/>
@@ -16049,6 +16049,22 @@
             <a:r>
               <a:rPr lang="en-US"/>
               <a:t>10259046 - Samuel Silva Caetite</a:t>
+            </a:r>
+            <a:endParaRPr/>
+          </a:p>
+          <a:p>
+            <a:pPr indent="0" lvl="0" marL="0">
+              <a:spcBef>
+                <a:spcPts val="1000"/>
+              </a:spcBef>
+              <a:spcAft>
+                <a:spcPts val="0"/>
+              </a:spcAft>
+              <a:buNone/>
+            </a:pPr>
+            <a:r>
+              <a:rPr lang="en-US"/>
+              <a:t>10387644 - Fernando Karchiloff Gouveia de Amorim</a:t>
             </a:r>
             <a:endParaRPr/>
           </a:p>
@@ -16835,6 +16851,285 @@
 </file>
 
 <file path=ppt/theme/theme1.xml><?xml version="1.0" encoding="utf-8"?>
+<a:theme xmlns:a="http://schemas.openxmlformats.org/drawingml/2006/main" xmlns:r="http://schemas.openxmlformats.org/officeDocument/2006/relationships">
+  <a:themeElements>
+    <a:clrScheme name="Default">
+      <a:dk1>
+        <a:srgbClr val="000000"/>
+      </a:dk1>
+      <a:lt1>
+        <a:srgbClr val="FFFFFF"/>
+      </a:lt1>
+      <a:dk2>
+        <a:srgbClr val="158158"/>
+      </a:dk2>
+      <a:lt2>
+        <a:srgbClr val="F3F3F3"/>
+      </a:lt2>
+      <a:accent1>
+        <a:srgbClr val="058DC7"/>
+      </a:accent1>
+      <a:accent2>
+        <a:srgbClr val="50B432"/>
+      </a:accent2>
+      <a:accent3>
+        <a:srgbClr val="ED561B"/>
+      </a:accent3>
+      <a:accent4>
+        <a:srgbClr val="EDEF00"/>
+      </a:accent4>
+      <a:accent5>
+        <a:srgbClr val="24CBE5"/>
+      </a:accent5>
+      <a:accent6>
+        <a:srgbClr val="64E572"/>
+      </a:accent6>
+      <a:hlink>
+        <a:srgbClr val="2200CC"/>
+      </a:hlink>
+      <a:folHlink>
+        <a:srgbClr val="551A8B"/>
+      </a:folHlink>
+    </a:clrScheme>
+    <a:fontScheme name="Office">
+      <a:majorFont>
+        <a:latin typeface="Arial"/>
+        <a:ea typeface=""/>
+        <a:cs typeface=""/>
+        <a:font script="Jpan" typeface="ＭＳ Ｐゴシック"/>
+        <a:font script="Hang" typeface="맑은 고딕"/>
+        <a:font script="Hans" typeface="宋体"/>
+        <a:font script="Hant" typeface="新細明體"/>
+        <a:font script="Arab" typeface="Times New Roman"/>
+        <a:font script="Hebr" typeface="Times New Roman"/>
+        <a:font script="Thai" typeface="Angsana New"/>
+        <a:font script="Ethi" typeface="Nyala"/>
+        <a:font script="Beng" typeface="Vrinda"/>
+        <a:font script="Gujr" typeface="Shruti"/>
+        <a:font script="Khmr" typeface="MoolBoran"/>
+        <a:font script="Knda" typeface="Tunga"/>
+        <a:font script="Guru" typeface="Raavi"/>
+        <a:font script="Cans" typeface="Euphemia"/>
+        <a:font script="Cher" typeface="Plantagenet Cherokee"/>
+        <a:font script="Yiii" typeface="Microsoft Yi Baiti"/>
+        <a:font script="Tibt" typeface="Microsoft Himalaya"/>
+        <a:font script="Thaa" typeface="MV Boli"/>
+        <a:font script="Deva" typeface="Mangal"/>
+        <a:font script="Telu" typeface="Gautami"/>
+        <a:font script="Taml" typeface="Latha"/>
+        <a:font script="Syrc" typeface="Estrangelo Edessa"/>
+        <a:font script="Orya" typeface="Kalinga"/>
+        <a:font script="Mlym" typeface="Kartika"/>
+        <a:font script="Laoo" typeface="DokChampa"/>
+        <a:font script="Sinh" typeface="Iskoola Pota"/>
+        <a:font script="Mong" typeface="Mongolian Baiti"/>
+        <a:font script="Viet" typeface="Times New Roman"/>
+        <a:font script="Uigh" typeface="Microsoft Uighur"/>
+        <a:font script="Geor" typeface="Sylfaen"/>
+      </a:majorFont>
+      <a:minorFont>
+        <a:latin typeface="Arial"/>
+        <a:ea typeface=""/>
+        <a:cs typeface=""/>
+        <a:font script="Jpan" typeface="ＭＳ Ｐゴシック"/>
+        <a:font script="Hang" typeface="맑은 고딕"/>
+        <a:font script="Hans" typeface="宋体"/>
+        <a:font script="Hant" typeface="新細明體"/>
+        <a:font script="Arab" typeface="Arial"/>
+        <a:font script="Hebr" typeface="Arial"/>
+        <a:font script="Thai" typeface="Cordia New"/>
+        <a:font script="Ethi" typeface="Nyala"/>
+        <a:font script="Beng" typeface="Vrinda"/>
+        <a:font script="Gujr" typeface="Shruti"/>
+        <a:font script="Khmr" typeface="DaunPenh"/>
+        <a:font script="Knda" typeface="Tunga"/>
+        <a:font script="Guru" typeface="Raavi"/>
+        <a:font script="Cans" typeface="Euphemia"/>
+        <a:font script="Cher" typeface="Plantagenet Cherokee"/>
+        <a:font script="Yiii" typeface="Microsoft Yi Baiti"/>
+        <a:font script="Tibt" typeface="Microsoft Himalaya"/>
+        <a:font script="Thaa" typeface="MV Boli"/>
+        <a:font script="Deva" typeface="Mangal"/>
+        <a:font script="Telu" typeface="Gautami"/>
+        <a:font script="Taml" typeface="Latha"/>
+        <a:font script="Syrc" typeface="Estrangelo Edessa"/>
+        <a:font script="Orya" typeface="Kalinga"/>
+        <a:font script="Mlym" typeface="Kartika"/>
+        <a:font script="Laoo" typeface="DokChampa"/>
+        <a:font script="Sinh" typeface="Iskoola Pota"/>
+        <a:font script="Mong" typeface="Mongolian Baiti"/>
+        <a:font script="Viet" typeface="Arial"/>
+        <a:font script="Uigh" typeface="Microsoft Uighur"/>
+        <a:font script="Geor" typeface="Sylfaen"/>
+      </a:minorFont>
+    </a:fontScheme>
+    <a:fmtScheme name="Office">
+      <a:fillStyleLst>
+        <a:solidFill>
+          <a:schemeClr val="phClr"/>
+        </a:solidFill>
+        <a:gradFill rotWithShape="1">
+          <a:gsLst>
+            <a:gs pos="0">
+              <a:schemeClr val="phClr">
+                <a:tint val="50000"/>
+                <a:satMod val="300000"/>
+              </a:schemeClr>
+            </a:gs>
+            <a:gs pos="35000">
+              <a:schemeClr val="phClr">
+                <a:tint val="37000"/>
+                <a:satMod val="300000"/>
+              </a:schemeClr>
+            </a:gs>
+            <a:gs pos="100000">
+              <a:schemeClr val="phClr">
+                <a:tint val="15000"/>
+                <a:satMod val="350000"/>
+              </a:schemeClr>
+            </a:gs>
+          </a:gsLst>
+          <a:lin ang="16200000" scaled="1"/>
+        </a:gradFill>
+        <a:gradFill rotWithShape="1">
+          <a:gsLst>
+            <a:gs pos="0">
+              <a:schemeClr val="phClr">
+                <a:tint val="100000"/>
+                <a:shade val="100000"/>
+                <a:satMod val="130000"/>
+              </a:schemeClr>
+            </a:gs>
+            <a:gs pos="100000">
+              <a:schemeClr val="phClr">
+                <a:tint val="50000"/>
+                <a:shade val="100000"/>
+                <a:satMod val="350000"/>
+              </a:schemeClr>
+            </a:gs>
+          </a:gsLst>
+          <a:lin ang="16200000" scaled="0"/>
+        </a:gradFill>
+      </a:fillStyleLst>
+      <a:lnStyleLst>
+        <a:ln w="9525" cap="flat" cmpd="sng" algn="ctr">
+          <a:solidFill>
+            <a:schemeClr val="phClr">
+              <a:shade val="95000"/>
+              <a:satMod val="105000"/>
+            </a:schemeClr>
+          </a:solidFill>
+          <a:prstDash val="solid"/>
+        </a:ln>
+        <a:ln w="25400" cap="flat" cmpd="sng" algn="ctr">
+          <a:solidFill>
+            <a:schemeClr val="phClr"/>
+          </a:solidFill>
+          <a:prstDash val="solid"/>
+        </a:ln>
+        <a:ln w="38100" cap="flat" cmpd="sng" algn="ctr">
+          <a:solidFill>
+            <a:schemeClr val="phClr"/>
+          </a:solidFill>
+          <a:prstDash val="solid"/>
+        </a:ln>
+      </a:lnStyleLst>
+      <a:effectStyleLst>
+        <a:effectStyle>
+          <a:effectLst>
+            <a:outerShdw blurRad="40000" dist="20000" dir="5400000" rotWithShape="0">
+              <a:srgbClr val="000000">
+                <a:alpha val="38000"/>
+              </a:srgbClr>
+            </a:outerShdw>
+          </a:effectLst>
+        </a:effectStyle>
+        <a:effectStyle>
+          <a:effectLst>
+            <a:outerShdw blurRad="40000" dist="23000" dir="5400000" rotWithShape="0">
+              <a:srgbClr val="000000">
+                <a:alpha val="35000"/>
+              </a:srgbClr>
+            </a:outerShdw>
+          </a:effectLst>
+        </a:effectStyle>
+        <a:effectStyle>
+          <a:effectLst>
+            <a:outerShdw blurRad="40000" dist="23000" dir="5400000" rotWithShape="0">
+              <a:srgbClr val="000000">
+                <a:alpha val="35000"/>
+              </a:srgbClr>
+            </a:outerShdw>
+          </a:effectLst>
+          <a:scene3d>
+            <a:camera prst="orthographicFront">
+              <a:rot lat="0" lon="0" rev="0"/>
+            </a:camera>
+            <a:lightRig rig="threePt" dir="t">
+              <a:rot lat="0" lon="0" rev="1200000"/>
+            </a:lightRig>
+          </a:scene3d>
+          <a:sp3d>
+            <a:bevelT w="63500" h="25400"/>
+          </a:sp3d>
+        </a:effectStyle>
+      </a:effectStyleLst>
+      <a:bgFillStyleLst>
+        <a:solidFill>
+          <a:schemeClr val="phClr"/>
+        </a:solidFill>
+        <a:gradFill rotWithShape="1">
+          <a:gsLst>
+            <a:gs pos="0">
+              <a:schemeClr val="phClr">
+                <a:tint val="40000"/>
+                <a:satMod val="350000"/>
+              </a:schemeClr>
+            </a:gs>
+            <a:gs pos="40000">
+              <a:schemeClr val="phClr">
+                <a:tint val="45000"/>
+                <a:shade val="99000"/>
+                <a:satMod val="350000"/>
+              </a:schemeClr>
+            </a:gs>
+            <a:gs pos="100000">
+              <a:schemeClr val="phClr">
+                <a:shade val="20000"/>
+                <a:satMod val="255000"/>
+              </a:schemeClr>
+            </a:gs>
+          </a:gsLst>
+          <a:path path="circle">
+            <a:fillToRect l="50000" t="-80000" r="50000" b="180000"/>
+          </a:path>
+        </a:gradFill>
+        <a:gradFill rotWithShape="1">
+          <a:gsLst>
+            <a:gs pos="0">
+              <a:schemeClr val="phClr">
+                <a:tint val="80000"/>
+                <a:satMod val="300000"/>
+              </a:schemeClr>
+            </a:gs>
+            <a:gs pos="100000">
+              <a:schemeClr val="phClr">
+                <a:shade val="30000"/>
+                <a:satMod val="200000"/>
+              </a:schemeClr>
+            </a:gs>
+          </a:gsLst>
+          <a:path path="circle">
+            <a:fillToRect l="50000" t="50000" r="50000" b="50000"/>
+          </a:path>
+        </a:gradFill>
+      </a:bgFillStyleLst>
+    </a:fmtScheme>
+  </a:themeElements>
+</a:theme>
+</file>
+
+<file path=ppt/theme/theme2.xml><?xml version="1.0" encoding="utf-8"?>
 <a:theme xmlns:a="http://schemas.openxmlformats.org/drawingml/2006/main" xmlns:r="http://schemas.openxmlformats.org/officeDocument/2006/relationships" name="Tema do Office">
   <a:themeElements>
     <a:clrScheme name="Office">
@@ -17111,283 +17406,4 @@
     </a:fmtScheme>
   </a:themeElements>
 </a:theme>
-</file>
-
-<file path=ppt/theme/theme2.xml><?xml version="1.0" encoding="utf-8"?>
-<a:theme xmlns:a="http://schemas.openxmlformats.org/drawingml/2006/main" xmlns:r="http://schemas.openxmlformats.org/officeDocument/2006/relationships">
-  <a:themeElements>
-    <a:clrScheme name="Default">
-      <a:dk1>
-        <a:srgbClr val="000000"/>
-      </a:dk1>
-      <a:lt1>
-        <a:srgbClr val="FFFFFF"/>
-      </a:lt1>
-      <a:dk2>
-        <a:srgbClr val="158158"/>
-      </a:dk2>
-      <a:lt2>
-        <a:srgbClr val="F3F3F3"/>
-      </a:lt2>
-      <a:accent1>
-        <a:srgbClr val="058DC7"/>
-      </a:accent1>
-      <a:accent2>
-        <a:srgbClr val="50B432"/>
-      </a:accent2>
-      <a:accent3>
-        <a:srgbClr val="ED561B"/>
-      </a:accent3>
-      <a:accent4>
-        <a:srgbClr val="EDEF00"/>
-      </a:accent4>
-      <a:accent5>
-        <a:srgbClr val="24CBE5"/>
-      </a:accent5>
-      <a:accent6>
-        <a:srgbClr val="64E572"/>
-      </a:accent6>
-      <a:hlink>
-        <a:srgbClr val="2200CC"/>
-      </a:hlink>
-      <a:folHlink>
-        <a:srgbClr val="551A8B"/>
-      </a:folHlink>
-    </a:clrScheme>
-    <a:fontScheme name="Office">
-      <a:majorFont>
-        <a:latin typeface="Arial"/>
-        <a:ea typeface=""/>
-        <a:cs typeface=""/>
-        <a:font script="Jpan" typeface="ＭＳ Ｐゴシック"/>
-        <a:font script="Hang" typeface="맑은 고딕"/>
-        <a:font script="Hans" typeface="宋体"/>
-        <a:font script="Hant" typeface="新細明體"/>
-        <a:font script="Arab" typeface="Times New Roman"/>
-        <a:font script="Hebr" typeface="Times New Roman"/>
-        <a:font script="Thai" typeface="Angsana New"/>
-        <a:font script="Ethi" typeface="Nyala"/>
-        <a:font script="Beng" typeface="Vrinda"/>
-        <a:font script="Gujr" typeface="Shruti"/>
-        <a:font script="Khmr" typeface="MoolBoran"/>
-        <a:font script="Knda" typeface="Tunga"/>
-        <a:font script="Guru" typeface="Raavi"/>
-        <a:font script="Cans" typeface="Euphemia"/>
-        <a:font script="Cher" typeface="Plantagenet Cherokee"/>
-        <a:font script="Yiii" typeface="Microsoft Yi Baiti"/>
-        <a:font script="Tibt" typeface="Microsoft Himalaya"/>
-        <a:font script="Thaa" typeface="MV Boli"/>
-        <a:font script="Deva" typeface="Mangal"/>
-        <a:font script="Telu" typeface="Gautami"/>
-        <a:font script="Taml" typeface="Latha"/>
-        <a:font script="Syrc" typeface="Estrangelo Edessa"/>
-        <a:font script="Orya" typeface="Kalinga"/>
-        <a:font script="Mlym" typeface="Kartika"/>
-        <a:font script="Laoo" typeface="DokChampa"/>
-        <a:font script="Sinh" typeface="Iskoola Pota"/>
-        <a:font script="Mong" typeface="Mongolian Baiti"/>
-        <a:font script="Viet" typeface="Times New Roman"/>
-        <a:font script="Uigh" typeface="Microsoft Uighur"/>
-        <a:font script="Geor" typeface="Sylfaen"/>
-      </a:majorFont>
-      <a:minorFont>
-        <a:latin typeface="Arial"/>
-        <a:ea typeface=""/>
-        <a:cs typeface=""/>
-        <a:font script="Jpan" typeface="ＭＳ Ｐゴシック"/>
-        <a:font script="Hang" typeface="맑은 고딕"/>
-        <a:font script="Hans" typeface="宋体"/>
-        <a:font script="Hant" typeface="新細明體"/>
-        <a:font script="Arab" typeface="Arial"/>
-        <a:font script="Hebr" typeface="Arial"/>
-        <a:font script="Thai" typeface="Cordia New"/>
-        <a:font script="Ethi" typeface="Nyala"/>
-        <a:font script="Beng" typeface="Vrinda"/>
-        <a:font script="Gujr" typeface="Shruti"/>
-        <a:font script="Khmr" typeface="DaunPenh"/>
-        <a:font script="Knda" typeface="Tunga"/>
-        <a:font script="Guru" typeface="Raavi"/>
-        <a:font script="Cans" typeface="Euphemia"/>
-        <a:font script="Cher" typeface="Plantagenet Cherokee"/>
-        <a:font script="Yiii" typeface="Microsoft Yi Baiti"/>
-        <a:font script="Tibt" typeface="Microsoft Himalaya"/>
-        <a:font script="Thaa" typeface="MV Boli"/>
-        <a:font script="Deva" typeface="Mangal"/>
-        <a:font script="Telu" typeface="Gautami"/>
-        <a:font script="Taml" typeface="Latha"/>
-        <a:font script="Syrc" typeface="Estrangelo Edessa"/>
-        <a:font script="Orya" typeface="Kalinga"/>
-        <a:font script="Mlym" typeface="Kartika"/>
-        <a:font script="Laoo" typeface="DokChampa"/>
-        <a:font script="Sinh" typeface="Iskoola Pota"/>
-        <a:font script="Mong" typeface="Mongolian Baiti"/>
-        <a:font script="Viet" typeface="Arial"/>
-        <a:font script="Uigh" typeface="Microsoft Uighur"/>
-        <a:font script="Geor" typeface="Sylfaen"/>
-      </a:minorFont>
-    </a:fontScheme>
-    <a:fmtScheme name="Office">
-      <a:fillStyleLst>
-        <a:solidFill>
-          <a:schemeClr val="phClr"/>
-        </a:solidFill>
-        <a:gradFill rotWithShape="1">
-          <a:gsLst>
-            <a:gs pos="0">
-              <a:schemeClr val="phClr">
-                <a:tint val="50000"/>
-                <a:satMod val="300000"/>
-              </a:schemeClr>
-            </a:gs>
-            <a:gs pos="35000">
-              <a:schemeClr val="phClr">
-                <a:tint val="37000"/>
-                <a:satMod val="300000"/>
-              </a:schemeClr>
-            </a:gs>
-            <a:gs pos="100000">
-              <a:schemeClr val="phClr">
-                <a:tint val="15000"/>
-                <a:satMod val="350000"/>
-              </a:schemeClr>
-            </a:gs>
-          </a:gsLst>
-          <a:lin ang="16200000" scaled="1"/>
-        </a:gradFill>
-        <a:gradFill rotWithShape="1">
-          <a:gsLst>
-            <a:gs pos="0">
-              <a:schemeClr val="phClr">
-                <a:tint val="100000"/>
-                <a:shade val="100000"/>
-                <a:satMod val="130000"/>
-              </a:schemeClr>
-            </a:gs>
-            <a:gs pos="100000">
-              <a:schemeClr val="phClr">
-                <a:tint val="50000"/>
-                <a:shade val="100000"/>
-                <a:satMod val="350000"/>
-              </a:schemeClr>
-            </a:gs>
-          </a:gsLst>
-          <a:lin ang="16200000" scaled="0"/>
-        </a:gradFill>
-      </a:fillStyleLst>
-      <a:lnStyleLst>
-        <a:ln w="9525" cap="flat" cmpd="sng" algn="ctr">
-          <a:solidFill>
-            <a:schemeClr val="phClr">
-              <a:shade val="95000"/>
-              <a:satMod val="105000"/>
-            </a:schemeClr>
-          </a:solidFill>
-          <a:prstDash val="solid"/>
-        </a:ln>
-        <a:ln w="25400" cap="flat" cmpd="sng" algn="ctr">
-          <a:solidFill>
-            <a:schemeClr val="phClr"/>
-          </a:solidFill>
-          <a:prstDash val="solid"/>
-        </a:ln>
-        <a:ln w="38100" cap="flat" cmpd="sng" algn="ctr">
-          <a:solidFill>
-            <a:schemeClr val="phClr"/>
-          </a:solidFill>
-          <a:prstDash val="solid"/>
-        </a:ln>
-      </a:lnStyleLst>
-      <a:effectStyleLst>
-        <a:effectStyle>
-          <a:effectLst>
-            <a:outerShdw blurRad="40000" dist="20000" dir="5400000" rotWithShape="0">
-              <a:srgbClr val="000000">
-                <a:alpha val="38000"/>
-              </a:srgbClr>
-            </a:outerShdw>
-          </a:effectLst>
-        </a:effectStyle>
-        <a:effectStyle>
-          <a:effectLst>
-            <a:outerShdw blurRad="40000" dist="23000" dir="5400000" rotWithShape="0">
-              <a:srgbClr val="000000">
-                <a:alpha val="35000"/>
-              </a:srgbClr>
-            </a:outerShdw>
-          </a:effectLst>
-        </a:effectStyle>
-        <a:effectStyle>
-          <a:effectLst>
-            <a:outerShdw blurRad="40000" dist="23000" dir="5400000" rotWithShape="0">
-              <a:srgbClr val="000000">
-                <a:alpha val="35000"/>
-              </a:srgbClr>
-            </a:outerShdw>
-          </a:effectLst>
-          <a:scene3d>
-            <a:camera prst="orthographicFront">
-              <a:rot lat="0" lon="0" rev="0"/>
-            </a:camera>
-            <a:lightRig rig="threePt" dir="t">
-              <a:rot lat="0" lon="0" rev="1200000"/>
-            </a:lightRig>
-          </a:scene3d>
-          <a:sp3d>
-            <a:bevelT w="63500" h="25400"/>
-          </a:sp3d>
-        </a:effectStyle>
-      </a:effectStyleLst>
-      <a:bgFillStyleLst>
-        <a:solidFill>
-          <a:schemeClr val="phClr"/>
-        </a:solidFill>
-        <a:gradFill rotWithShape="1">
-          <a:gsLst>
-            <a:gs pos="0">
-              <a:schemeClr val="phClr">
-                <a:tint val="40000"/>
-                <a:satMod val="350000"/>
-              </a:schemeClr>
-            </a:gs>
-            <a:gs pos="40000">
-              <a:schemeClr val="phClr">
-                <a:tint val="45000"/>
-                <a:shade val="99000"/>
-                <a:satMod val="350000"/>
-              </a:schemeClr>
-            </a:gs>
-            <a:gs pos="100000">
-              <a:schemeClr val="phClr">
-                <a:shade val="20000"/>
-                <a:satMod val="255000"/>
-              </a:schemeClr>
-            </a:gs>
-          </a:gsLst>
-          <a:path path="circle">
-            <a:fillToRect l="50000" t="-80000" r="50000" b="180000"/>
-          </a:path>
-        </a:gradFill>
-        <a:gradFill rotWithShape="1">
-          <a:gsLst>
-            <a:gs pos="0">
-              <a:schemeClr val="phClr">
-                <a:tint val="80000"/>
-                <a:satMod val="300000"/>
-              </a:schemeClr>
-            </a:gs>
-            <a:gs pos="100000">
-              <a:schemeClr val="phClr">
-                <a:shade val="30000"/>
-                <a:satMod val="200000"/>
-              </a:schemeClr>
-            </a:gs>
-          </a:gsLst>
-          <a:path path="circle">
-            <a:fillToRect l="50000" t="50000" r="50000" b="50000"/>
-          </a:path>
-        </a:gradFill>
-      </a:bgFillStyleLst>
-    </a:fmtScheme>
-  </a:themeElements>
-</a:theme>
 </file>
</xml_diff>

<commit_message>
Revert "Atualização dos .pdf e .pdf"
This reverts commit 46795aa5c581ebce52c471ae541d1d4e2bfabeed.
</commit_message>
<xml_diff>
--- a/Telas-DIONISIO.pptx
+++ b/Telas-DIONISIO.pptx
@@ -15932,8 +15932,8 @@
         </p:nvSpPr>
         <p:spPr>
           <a:xfrm>
-            <a:off x="1524000" y="2850323"/>
-            <a:ext cx="9144000" cy="3843900"/>
+            <a:off x="1524000" y="3177687"/>
+            <a:ext cx="9144000" cy="3255900"/>
           </a:xfrm>
           <a:prstGeom prst="rect">
             <a:avLst/>
@@ -16049,22 +16049,6 @@
             <a:r>
               <a:rPr lang="en-US"/>
               <a:t>10259046 - Samuel Silva Caetite</a:t>
-            </a:r>
-            <a:endParaRPr/>
-          </a:p>
-          <a:p>
-            <a:pPr indent="0" lvl="0" marL="0">
-              <a:spcBef>
-                <a:spcPts val="1000"/>
-              </a:spcBef>
-              <a:spcAft>
-                <a:spcPts val="0"/>
-              </a:spcAft>
-              <a:buNone/>
-            </a:pPr>
-            <a:r>
-              <a:rPr lang="en-US"/>
-              <a:t>10387644 - Fernando Karchiloff Gouveia de Amorim</a:t>
             </a:r>
             <a:endParaRPr/>
           </a:p>
@@ -16851,6 +16835,285 @@
 </file>
 
 <file path=ppt/theme/theme1.xml><?xml version="1.0" encoding="utf-8"?>
+<a:theme xmlns:a="http://schemas.openxmlformats.org/drawingml/2006/main" xmlns:r="http://schemas.openxmlformats.org/officeDocument/2006/relationships" name="Tema do Office">
+  <a:themeElements>
+    <a:clrScheme name="Office">
+      <a:dk1>
+        <a:srgbClr val="000000"/>
+      </a:dk1>
+      <a:lt1>
+        <a:srgbClr val="FFFFFF"/>
+      </a:lt1>
+      <a:dk2>
+        <a:srgbClr val="44546A"/>
+      </a:dk2>
+      <a:lt2>
+        <a:srgbClr val="E7E6E6"/>
+      </a:lt2>
+      <a:accent1>
+        <a:srgbClr val="4472C4"/>
+      </a:accent1>
+      <a:accent2>
+        <a:srgbClr val="ED7D31"/>
+      </a:accent2>
+      <a:accent3>
+        <a:srgbClr val="A5A5A5"/>
+      </a:accent3>
+      <a:accent4>
+        <a:srgbClr val="FFC000"/>
+      </a:accent4>
+      <a:accent5>
+        <a:srgbClr val="5B9BD5"/>
+      </a:accent5>
+      <a:accent6>
+        <a:srgbClr val="70AD47"/>
+      </a:accent6>
+      <a:hlink>
+        <a:srgbClr val="0563C1"/>
+      </a:hlink>
+      <a:folHlink>
+        <a:srgbClr val="954F72"/>
+      </a:folHlink>
+    </a:clrScheme>
+    <a:fontScheme name="Office">
+      <a:majorFont>
+        <a:latin typeface="Arial"/>
+        <a:ea typeface=""/>
+        <a:cs typeface=""/>
+        <a:font script="Jpan" typeface="ＭＳ Ｐゴシック"/>
+        <a:font script="Hang" typeface="맑은 고딕"/>
+        <a:font script="Hans" typeface="宋体"/>
+        <a:font script="Hant" typeface="新細明體"/>
+        <a:font script="Arab" typeface="Times New Roman"/>
+        <a:font script="Hebr" typeface="Times New Roman"/>
+        <a:font script="Thai" typeface="Angsana New"/>
+        <a:font script="Ethi" typeface="Nyala"/>
+        <a:font script="Beng" typeface="Vrinda"/>
+        <a:font script="Gujr" typeface="Shruti"/>
+        <a:font script="Khmr" typeface="MoolBoran"/>
+        <a:font script="Knda" typeface="Tunga"/>
+        <a:font script="Guru" typeface="Raavi"/>
+        <a:font script="Cans" typeface="Euphemia"/>
+        <a:font script="Cher" typeface="Plantagenet Cherokee"/>
+        <a:font script="Yiii" typeface="Microsoft Yi Baiti"/>
+        <a:font script="Tibt" typeface="Microsoft Himalaya"/>
+        <a:font script="Thaa" typeface="MV Boli"/>
+        <a:font script="Deva" typeface="Mangal"/>
+        <a:font script="Telu" typeface="Gautami"/>
+        <a:font script="Taml" typeface="Latha"/>
+        <a:font script="Syrc" typeface="Estrangelo Edessa"/>
+        <a:font script="Orya" typeface="Kalinga"/>
+        <a:font script="Mlym" typeface="Kartika"/>
+        <a:font script="Laoo" typeface="DokChampa"/>
+        <a:font script="Sinh" typeface="Iskoola Pota"/>
+        <a:font script="Mong" typeface="Mongolian Baiti"/>
+        <a:font script="Viet" typeface="Times New Roman"/>
+        <a:font script="Uigh" typeface="Microsoft Uighur"/>
+        <a:font script="Geor" typeface="Sylfaen"/>
+      </a:majorFont>
+      <a:minorFont>
+        <a:latin typeface="Arial"/>
+        <a:ea typeface=""/>
+        <a:cs typeface=""/>
+        <a:font script="Jpan" typeface="ＭＳ Ｐゴシック"/>
+        <a:font script="Hang" typeface="맑은 고딕"/>
+        <a:font script="Hans" typeface="宋体"/>
+        <a:font script="Hant" typeface="新細明體"/>
+        <a:font script="Arab" typeface="Arial"/>
+        <a:font script="Hebr" typeface="Arial"/>
+        <a:font script="Thai" typeface="Cordia New"/>
+        <a:font script="Ethi" typeface="Nyala"/>
+        <a:font script="Beng" typeface="Vrinda"/>
+        <a:font script="Gujr" typeface="Shruti"/>
+        <a:font script="Khmr" typeface="DaunPenh"/>
+        <a:font script="Knda" typeface="Tunga"/>
+        <a:font script="Guru" typeface="Raavi"/>
+        <a:font script="Cans" typeface="Euphemia"/>
+        <a:font script="Cher" typeface="Plantagenet Cherokee"/>
+        <a:font script="Yiii" typeface="Microsoft Yi Baiti"/>
+        <a:font script="Tibt" typeface="Microsoft Himalaya"/>
+        <a:font script="Thaa" typeface="MV Boli"/>
+        <a:font script="Deva" typeface="Mangal"/>
+        <a:font script="Telu" typeface="Gautami"/>
+        <a:font script="Taml" typeface="Latha"/>
+        <a:font script="Syrc" typeface="Estrangelo Edessa"/>
+        <a:font script="Orya" typeface="Kalinga"/>
+        <a:font script="Mlym" typeface="Kartika"/>
+        <a:font script="Laoo" typeface="DokChampa"/>
+        <a:font script="Sinh" typeface="Iskoola Pota"/>
+        <a:font script="Mong" typeface="Mongolian Baiti"/>
+        <a:font script="Viet" typeface="Arial"/>
+        <a:font script="Uigh" typeface="Microsoft Uighur"/>
+        <a:font script="Geor" typeface="Sylfaen"/>
+      </a:minorFont>
+    </a:fontScheme>
+    <a:fmtScheme name="Office">
+      <a:fillStyleLst>
+        <a:solidFill>
+          <a:schemeClr val="phClr"/>
+        </a:solidFill>
+        <a:gradFill rotWithShape="1">
+          <a:gsLst>
+            <a:gs pos="0">
+              <a:schemeClr val="phClr">
+                <a:tint val="50000"/>
+                <a:satMod val="300000"/>
+              </a:schemeClr>
+            </a:gs>
+            <a:gs pos="35000">
+              <a:schemeClr val="phClr">
+                <a:tint val="37000"/>
+                <a:satMod val="300000"/>
+              </a:schemeClr>
+            </a:gs>
+            <a:gs pos="100000">
+              <a:schemeClr val="phClr">
+                <a:tint val="15000"/>
+                <a:satMod val="350000"/>
+              </a:schemeClr>
+            </a:gs>
+          </a:gsLst>
+          <a:lin ang="16200000" scaled="1"/>
+        </a:gradFill>
+        <a:gradFill rotWithShape="1">
+          <a:gsLst>
+            <a:gs pos="0">
+              <a:schemeClr val="phClr">
+                <a:tint val="100000"/>
+                <a:shade val="100000"/>
+                <a:satMod val="130000"/>
+              </a:schemeClr>
+            </a:gs>
+            <a:gs pos="100000">
+              <a:schemeClr val="phClr">
+                <a:tint val="50000"/>
+                <a:shade val="100000"/>
+                <a:satMod val="350000"/>
+              </a:schemeClr>
+            </a:gs>
+          </a:gsLst>
+          <a:lin ang="16200000" scaled="0"/>
+        </a:gradFill>
+      </a:fillStyleLst>
+      <a:lnStyleLst>
+        <a:ln w="9525" cap="flat" cmpd="sng" algn="ctr">
+          <a:solidFill>
+            <a:schemeClr val="phClr">
+              <a:shade val="95000"/>
+              <a:satMod val="105000"/>
+            </a:schemeClr>
+          </a:solidFill>
+          <a:prstDash val="solid"/>
+        </a:ln>
+        <a:ln w="25400" cap="flat" cmpd="sng" algn="ctr">
+          <a:solidFill>
+            <a:schemeClr val="phClr"/>
+          </a:solidFill>
+          <a:prstDash val="solid"/>
+        </a:ln>
+        <a:ln w="38100" cap="flat" cmpd="sng" algn="ctr">
+          <a:solidFill>
+            <a:schemeClr val="phClr"/>
+          </a:solidFill>
+          <a:prstDash val="solid"/>
+        </a:ln>
+      </a:lnStyleLst>
+      <a:effectStyleLst>
+        <a:effectStyle>
+          <a:effectLst>
+            <a:outerShdw blurRad="40000" dist="20000" dir="5400000" rotWithShape="0">
+              <a:srgbClr val="000000">
+                <a:alpha val="38000"/>
+              </a:srgbClr>
+            </a:outerShdw>
+          </a:effectLst>
+        </a:effectStyle>
+        <a:effectStyle>
+          <a:effectLst>
+            <a:outerShdw blurRad="40000" dist="23000" dir="5400000" rotWithShape="0">
+              <a:srgbClr val="000000">
+                <a:alpha val="35000"/>
+              </a:srgbClr>
+            </a:outerShdw>
+          </a:effectLst>
+        </a:effectStyle>
+        <a:effectStyle>
+          <a:effectLst>
+            <a:outerShdw blurRad="40000" dist="23000" dir="5400000" rotWithShape="0">
+              <a:srgbClr val="000000">
+                <a:alpha val="35000"/>
+              </a:srgbClr>
+            </a:outerShdw>
+          </a:effectLst>
+          <a:scene3d>
+            <a:camera prst="orthographicFront">
+              <a:rot lat="0" lon="0" rev="0"/>
+            </a:camera>
+            <a:lightRig rig="threePt" dir="t">
+              <a:rot lat="0" lon="0" rev="1200000"/>
+            </a:lightRig>
+          </a:scene3d>
+          <a:sp3d>
+            <a:bevelT w="63500" h="25400"/>
+          </a:sp3d>
+        </a:effectStyle>
+      </a:effectStyleLst>
+      <a:bgFillStyleLst>
+        <a:solidFill>
+          <a:schemeClr val="phClr"/>
+        </a:solidFill>
+        <a:gradFill rotWithShape="1">
+          <a:gsLst>
+            <a:gs pos="0">
+              <a:schemeClr val="phClr">
+                <a:tint val="40000"/>
+                <a:satMod val="350000"/>
+              </a:schemeClr>
+            </a:gs>
+            <a:gs pos="40000">
+              <a:schemeClr val="phClr">
+                <a:tint val="45000"/>
+                <a:shade val="99000"/>
+                <a:satMod val="350000"/>
+              </a:schemeClr>
+            </a:gs>
+            <a:gs pos="100000">
+              <a:schemeClr val="phClr">
+                <a:shade val="20000"/>
+                <a:satMod val="255000"/>
+              </a:schemeClr>
+            </a:gs>
+          </a:gsLst>
+          <a:path path="circle">
+            <a:fillToRect l="50000" t="-80000" r="50000" b="180000"/>
+          </a:path>
+        </a:gradFill>
+        <a:gradFill rotWithShape="1">
+          <a:gsLst>
+            <a:gs pos="0">
+              <a:schemeClr val="phClr">
+                <a:tint val="80000"/>
+                <a:satMod val="300000"/>
+              </a:schemeClr>
+            </a:gs>
+            <a:gs pos="100000">
+              <a:schemeClr val="phClr">
+                <a:shade val="30000"/>
+                <a:satMod val="200000"/>
+              </a:schemeClr>
+            </a:gs>
+          </a:gsLst>
+          <a:path path="circle">
+            <a:fillToRect l="50000" t="50000" r="50000" b="50000"/>
+          </a:path>
+        </a:gradFill>
+      </a:bgFillStyleLst>
+    </a:fmtScheme>
+  </a:themeElements>
+</a:theme>
+</file>
+
+<file path=ppt/theme/theme2.xml><?xml version="1.0" encoding="utf-8"?>
 <a:theme xmlns:a="http://schemas.openxmlformats.org/drawingml/2006/main" xmlns:r="http://schemas.openxmlformats.org/officeDocument/2006/relationships">
   <a:themeElements>
     <a:clrScheme name="Default">
@@ -17127,283 +17390,4 @@
     </a:fmtScheme>
   </a:themeElements>
 </a:theme>
-</file>
-
-<file path=ppt/theme/theme2.xml><?xml version="1.0" encoding="utf-8"?>
-<a:theme xmlns:a="http://schemas.openxmlformats.org/drawingml/2006/main" xmlns:r="http://schemas.openxmlformats.org/officeDocument/2006/relationships" name="Tema do Office">
-  <a:themeElements>
-    <a:clrScheme name="Office">
-      <a:dk1>
-        <a:srgbClr val="000000"/>
-      </a:dk1>
-      <a:lt1>
-        <a:srgbClr val="FFFFFF"/>
-      </a:lt1>
-      <a:dk2>
-        <a:srgbClr val="44546A"/>
-      </a:dk2>
-      <a:lt2>
-        <a:srgbClr val="E7E6E6"/>
-      </a:lt2>
-      <a:accent1>
-        <a:srgbClr val="4472C4"/>
-      </a:accent1>
-      <a:accent2>
-        <a:srgbClr val="ED7D31"/>
-      </a:accent2>
-      <a:accent3>
-        <a:srgbClr val="A5A5A5"/>
-      </a:accent3>
-      <a:accent4>
-        <a:srgbClr val="FFC000"/>
-      </a:accent4>
-      <a:accent5>
-        <a:srgbClr val="5B9BD5"/>
-      </a:accent5>
-      <a:accent6>
-        <a:srgbClr val="70AD47"/>
-      </a:accent6>
-      <a:hlink>
-        <a:srgbClr val="0563C1"/>
-      </a:hlink>
-      <a:folHlink>
-        <a:srgbClr val="954F72"/>
-      </a:folHlink>
-    </a:clrScheme>
-    <a:fontScheme name="Office">
-      <a:majorFont>
-        <a:latin typeface="Arial"/>
-        <a:ea typeface=""/>
-        <a:cs typeface=""/>
-        <a:font script="Jpan" typeface="ＭＳ Ｐゴシック"/>
-        <a:font script="Hang" typeface="맑은 고딕"/>
-        <a:font script="Hans" typeface="宋体"/>
-        <a:font script="Hant" typeface="新細明體"/>
-        <a:font script="Arab" typeface="Times New Roman"/>
-        <a:font script="Hebr" typeface="Times New Roman"/>
-        <a:font script="Thai" typeface="Angsana New"/>
-        <a:font script="Ethi" typeface="Nyala"/>
-        <a:font script="Beng" typeface="Vrinda"/>
-        <a:font script="Gujr" typeface="Shruti"/>
-        <a:font script="Khmr" typeface="MoolBoran"/>
-        <a:font script="Knda" typeface="Tunga"/>
-        <a:font script="Guru" typeface="Raavi"/>
-        <a:font script="Cans" typeface="Euphemia"/>
-        <a:font script="Cher" typeface="Plantagenet Cherokee"/>
-        <a:font script="Yiii" typeface="Microsoft Yi Baiti"/>
-        <a:font script="Tibt" typeface="Microsoft Himalaya"/>
-        <a:font script="Thaa" typeface="MV Boli"/>
-        <a:font script="Deva" typeface="Mangal"/>
-        <a:font script="Telu" typeface="Gautami"/>
-        <a:font script="Taml" typeface="Latha"/>
-        <a:font script="Syrc" typeface="Estrangelo Edessa"/>
-        <a:font script="Orya" typeface="Kalinga"/>
-        <a:font script="Mlym" typeface="Kartika"/>
-        <a:font script="Laoo" typeface="DokChampa"/>
-        <a:font script="Sinh" typeface="Iskoola Pota"/>
-        <a:font script="Mong" typeface="Mongolian Baiti"/>
-        <a:font script="Viet" typeface="Times New Roman"/>
-        <a:font script="Uigh" typeface="Microsoft Uighur"/>
-        <a:font script="Geor" typeface="Sylfaen"/>
-      </a:majorFont>
-      <a:minorFont>
-        <a:latin typeface="Arial"/>
-        <a:ea typeface=""/>
-        <a:cs typeface=""/>
-        <a:font script="Jpan" typeface="ＭＳ Ｐゴシック"/>
-        <a:font script="Hang" typeface="맑은 고딕"/>
-        <a:font script="Hans" typeface="宋体"/>
-        <a:font script="Hant" typeface="新細明體"/>
-        <a:font script="Arab" typeface="Arial"/>
-        <a:font script="Hebr" typeface="Arial"/>
-        <a:font script="Thai" typeface="Cordia New"/>
-        <a:font script="Ethi" typeface="Nyala"/>
-        <a:font script="Beng" typeface="Vrinda"/>
-        <a:font script="Gujr" typeface="Shruti"/>
-        <a:font script="Khmr" typeface="DaunPenh"/>
-        <a:font script="Knda" typeface="Tunga"/>
-        <a:font script="Guru" typeface="Raavi"/>
-        <a:font script="Cans" typeface="Euphemia"/>
-        <a:font script="Cher" typeface="Plantagenet Cherokee"/>
-        <a:font script="Yiii" typeface="Microsoft Yi Baiti"/>
-        <a:font script="Tibt" typeface="Microsoft Himalaya"/>
-        <a:font script="Thaa" typeface="MV Boli"/>
-        <a:font script="Deva" typeface="Mangal"/>
-        <a:font script="Telu" typeface="Gautami"/>
-        <a:font script="Taml" typeface="Latha"/>
-        <a:font script="Syrc" typeface="Estrangelo Edessa"/>
-        <a:font script="Orya" typeface="Kalinga"/>
-        <a:font script="Mlym" typeface="Kartika"/>
-        <a:font script="Laoo" typeface="DokChampa"/>
-        <a:font script="Sinh" typeface="Iskoola Pota"/>
-        <a:font script="Mong" typeface="Mongolian Baiti"/>
-        <a:font script="Viet" typeface="Arial"/>
-        <a:font script="Uigh" typeface="Microsoft Uighur"/>
-        <a:font script="Geor" typeface="Sylfaen"/>
-      </a:minorFont>
-    </a:fontScheme>
-    <a:fmtScheme name="Office">
-      <a:fillStyleLst>
-        <a:solidFill>
-          <a:schemeClr val="phClr"/>
-        </a:solidFill>
-        <a:gradFill rotWithShape="1">
-          <a:gsLst>
-            <a:gs pos="0">
-              <a:schemeClr val="phClr">
-                <a:tint val="50000"/>
-                <a:satMod val="300000"/>
-              </a:schemeClr>
-            </a:gs>
-            <a:gs pos="35000">
-              <a:schemeClr val="phClr">
-                <a:tint val="37000"/>
-                <a:satMod val="300000"/>
-              </a:schemeClr>
-            </a:gs>
-            <a:gs pos="100000">
-              <a:schemeClr val="phClr">
-                <a:tint val="15000"/>
-                <a:satMod val="350000"/>
-              </a:schemeClr>
-            </a:gs>
-          </a:gsLst>
-          <a:lin ang="16200000" scaled="1"/>
-        </a:gradFill>
-        <a:gradFill rotWithShape="1">
-          <a:gsLst>
-            <a:gs pos="0">
-              <a:schemeClr val="phClr">
-                <a:tint val="100000"/>
-                <a:shade val="100000"/>
-                <a:satMod val="130000"/>
-              </a:schemeClr>
-            </a:gs>
-            <a:gs pos="100000">
-              <a:schemeClr val="phClr">
-                <a:tint val="50000"/>
-                <a:shade val="100000"/>
-                <a:satMod val="350000"/>
-              </a:schemeClr>
-            </a:gs>
-          </a:gsLst>
-          <a:lin ang="16200000" scaled="0"/>
-        </a:gradFill>
-      </a:fillStyleLst>
-      <a:lnStyleLst>
-        <a:ln w="9525" cap="flat" cmpd="sng" algn="ctr">
-          <a:solidFill>
-            <a:schemeClr val="phClr">
-              <a:shade val="95000"/>
-              <a:satMod val="105000"/>
-            </a:schemeClr>
-          </a:solidFill>
-          <a:prstDash val="solid"/>
-        </a:ln>
-        <a:ln w="25400" cap="flat" cmpd="sng" algn="ctr">
-          <a:solidFill>
-            <a:schemeClr val="phClr"/>
-          </a:solidFill>
-          <a:prstDash val="solid"/>
-        </a:ln>
-        <a:ln w="38100" cap="flat" cmpd="sng" algn="ctr">
-          <a:solidFill>
-            <a:schemeClr val="phClr"/>
-          </a:solidFill>
-          <a:prstDash val="solid"/>
-        </a:ln>
-      </a:lnStyleLst>
-      <a:effectStyleLst>
-        <a:effectStyle>
-          <a:effectLst>
-            <a:outerShdw blurRad="40000" dist="20000" dir="5400000" rotWithShape="0">
-              <a:srgbClr val="000000">
-                <a:alpha val="38000"/>
-              </a:srgbClr>
-            </a:outerShdw>
-          </a:effectLst>
-        </a:effectStyle>
-        <a:effectStyle>
-          <a:effectLst>
-            <a:outerShdw blurRad="40000" dist="23000" dir="5400000" rotWithShape="0">
-              <a:srgbClr val="000000">
-                <a:alpha val="35000"/>
-              </a:srgbClr>
-            </a:outerShdw>
-          </a:effectLst>
-        </a:effectStyle>
-        <a:effectStyle>
-          <a:effectLst>
-            <a:outerShdw blurRad="40000" dist="23000" dir="5400000" rotWithShape="0">
-              <a:srgbClr val="000000">
-                <a:alpha val="35000"/>
-              </a:srgbClr>
-            </a:outerShdw>
-          </a:effectLst>
-          <a:scene3d>
-            <a:camera prst="orthographicFront">
-              <a:rot lat="0" lon="0" rev="0"/>
-            </a:camera>
-            <a:lightRig rig="threePt" dir="t">
-              <a:rot lat="0" lon="0" rev="1200000"/>
-            </a:lightRig>
-          </a:scene3d>
-          <a:sp3d>
-            <a:bevelT w="63500" h="25400"/>
-          </a:sp3d>
-        </a:effectStyle>
-      </a:effectStyleLst>
-      <a:bgFillStyleLst>
-        <a:solidFill>
-          <a:schemeClr val="phClr"/>
-        </a:solidFill>
-        <a:gradFill rotWithShape="1">
-          <a:gsLst>
-            <a:gs pos="0">
-              <a:schemeClr val="phClr">
-                <a:tint val="40000"/>
-                <a:satMod val="350000"/>
-              </a:schemeClr>
-            </a:gs>
-            <a:gs pos="40000">
-              <a:schemeClr val="phClr">
-                <a:tint val="45000"/>
-                <a:shade val="99000"/>
-                <a:satMod val="350000"/>
-              </a:schemeClr>
-            </a:gs>
-            <a:gs pos="100000">
-              <a:schemeClr val="phClr">
-                <a:shade val="20000"/>
-                <a:satMod val="255000"/>
-              </a:schemeClr>
-            </a:gs>
-          </a:gsLst>
-          <a:path path="circle">
-            <a:fillToRect l="50000" t="-80000" r="50000" b="180000"/>
-          </a:path>
-        </a:gradFill>
-        <a:gradFill rotWithShape="1">
-          <a:gsLst>
-            <a:gs pos="0">
-              <a:schemeClr val="phClr">
-                <a:tint val="80000"/>
-                <a:satMod val="300000"/>
-              </a:schemeClr>
-            </a:gs>
-            <a:gs pos="100000">
-              <a:schemeClr val="phClr">
-                <a:shade val="30000"/>
-                <a:satMod val="200000"/>
-              </a:schemeClr>
-            </a:gs>
-          </a:gsLst>
-          <a:path path="circle">
-            <a:fillToRect l="50000" t="50000" r="50000" b="50000"/>
-          </a:path>
-        </a:gradFill>
-      </a:bgFillStyleLst>
-    </a:fmtScheme>
-  </a:themeElements>
-</a:theme>
 </file>
</xml_diff>

<commit_message>
Atualização dos .pdf e .pptx das telas do Dionísio.
</commit_message>
<xml_diff>
--- a/Telas-DIONISIO.pptx
+++ b/Telas-DIONISIO.pptx
@@ -15932,8 +15932,8 @@
         </p:nvSpPr>
         <p:spPr>
           <a:xfrm>
-            <a:off x="1524000" y="3177687"/>
-            <a:ext cx="9144000" cy="3255900"/>
+            <a:off x="1524000" y="2850323"/>
+            <a:ext cx="9144000" cy="3843900"/>
           </a:xfrm>
           <a:prstGeom prst="rect">
             <a:avLst/>
@@ -16049,6 +16049,22 @@
             <a:r>
               <a:rPr lang="en-US"/>
               <a:t>10259046 - Samuel Silva Caetite</a:t>
+            </a:r>
+            <a:endParaRPr/>
+          </a:p>
+          <a:p>
+            <a:pPr indent="0" lvl="0" marL="0">
+              <a:spcBef>
+                <a:spcPts val="1000"/>
+              </a:spcBef>
+              <a:spcAft>
+                <a:spcPts val="0"/>
+              </a:spcAft>
+              <a:buNone/>
+            </a:pPr>
+            <a:r>
+              <a:rPr lang="en-US"/>
+              <a:t>10387644 - Fernando Karchiloff Gouveia de Amorim</a:t>
             </a:r>
             <a:endParaRPr/>
           </a:p>
@@ -16835,6 +16851,285 @@
 </file>
 
 <file path=ppt/theme/theme1.xml><?xml version="1.0" encoding="utf-8"?>
+<a:theme xmlns:a="http://schemas.openxmlformats.org/drawingml/2006/main" xmlns:r="http://schemas.openxmlformats.org/officeDocument/2006/relationships">
+  <a:themeElements>
+    <a:clrScheme name="Default">
+      <a:dk1>
+        <a:srgbClr val="000000"/>
+      </a:dk1>
+      <a:lt1>
+        <a:srgbClr val="FFFFFF"/>
+      </a:lt1>
+      <a:dk2>
+        <a:srgbClr val="158158"/>
+      </a:dk2>
+      <a:lt2>
+        <a:srgbClr val="F3F3F3"/>
+      </a:lt2>
+      <a:accent1>
+        <a:srgbClr val="058DC7"/>
+      </a:accent1>
+      <a:accent2>
+        <a:srgbClr val="50B432"/>
+      </a:accent2>
+      <a:accent3>
+        <a:srgbClr val="ED561B"/>
+      </a:accent3>
+      <a:accent4>
+        <a:srgbClr val="EDEF00"/>
+      </a:accent4>
+      <a:accent5>
+        <a:srgbClr val="24CBE5"/>
+      </a:accent5>
+      <a:accent6>
+        <a:srgbClr val="64E572"/>
+      </a:accent6>
+      <a:hlink>
+        <a:srgbClr val="2200CC"/>
+      </a:hlink>
+      <a:folHlink>
+        <a:srgbClr val="551A8B"/>
+      </a:folHlink>
+    </a:clrScheme>
+    <a:fontScheme name="Office">
+      <a:majorFont>
+        <a:latin typeface="Arial"/>
+        <a:ea typeface=""/>
+        <a:cs typeface=""/>
+        <a:font script="Jpan" typeface="ＭＳ Ｐゴシック"/>
+        <a:font script="Hang" typeface="맑은 고딕"/>
+        <a:font script="Hans" typeface="宋体"/>
+        <a:font script="Hant" typeface="新細明體"/>
+        <a:font script="Arab" typeface="Times New Roman"/>
+        <a:font script="Hebr" typeface="Times New Roman"/>
+        <a:font script="Thai" typeface="Angsana New"/>
+        <a:font script="Ethi" typeface="Nyala"/>
+        <a:font script="Beng" typeface="Vrinda"/>
+        <a:font script="Gujr" typeface="Shruti"/>
+        <a:font script="Khmr" typeface="MoolBoran"/>
+        <a:font script="Knda" typeface="Tunga"/>
+        <a:font script="Guru" typeface="Raavi"/>
+        <a:font script="Cans" typeface="Euphemia"/>
+        <a:font script="Cher" typeface="Plantagenet Cherokee"/>
+        <a:font script="Yiii" typeface="Microsoft Yi Baiti"/>
+        <a:font script="Tibt" typeface="Microsoft Himalaya"/>
+        <a:font script="Thaa" typeface="MV Boli"/>
+        <a:font script="Deva" typeface="Mangal"/>
+        <a:font script="Telu" typeface="Gautami"/>
+        <a:font script="Taml" typeface="Latha"/>
+        <a:font script="Syrc" typeface="Estrangelo Edessa"/>
+        <a:font script="Orya" typeface="Kalinga"/>
+        <a:font script="Mlym" typeface="Kartika"/>
+        <a:font script="Laoo" typeface="DokChampa"/>
+        <a:font script="Sinh" typeface="Iskoola Pota"/>
+        <a:font script="Mong" typeface="Mongolian Baiti"/>
+        <a:font script="Viet" typeface="Times New Roman"/>
+        <a:font script="Uigh" typeface="Microsoft Uighur"/>
+        <a:font script="Geor" typeface="Sylfaen"/>
+      </a:majorFont>
+      <a:minorFont>
+        <a:latin typeface="Arial"/>
+        <a:ea typeface=""/>
+        <a:cs typeface=""/>
+        <a:font script="Jpan" typeface="ＭＳ Ｐゴシック"/>
+        <a:font script="Hang" typeface="맑은 고딕"/>
+        <a:font script="Hans" typeface="宋体"/>
+        <a:font script="Hant" typeface="新細明體"/>
+        <a:font script="Arab" typeface="Arial"/>
+        <a:font script="Hebr" typeface="Arial"/>
+        <a:font script="Thai" typeface="Cordia New"/>
+        <a:font script="Ethi" typeface="Nyala"/>
+        <a:font script="Beng" typeface="Vrinda"/>
+        <a:font script="Gujr" typeface="Shruti"/>
+        <a:font script="Khmr" typeface="DaunPenh"/>
+        <a:font script="Knda" typeface="Tunga"/>
+        <a:font script="Guru" typeface="Raavi"/>
+        <a:font script="Cans" typeface="Euphemia"/>
+        <a:font script="Cher" typeface="Plantagenet Cherokee"/>
+        <a:font script="Yiii" typeface="Microsoft Yi Baiti"/>
+        <a:font script="Tibt" typeface="Microsoft Himalaya"/>
+        <a:font script="Thaa" typeface="MV Boli"/>
+        <a:font script="Deva" typeface="Mangal"/>
+        <a:font script="Telu" typeface="Gautami"/>
+        <a:font script="Taml" typeface="Latha"/>
+        <a:font script="Syrc" typeface="Estrangelo Edessa"/>
+        <a:font script="Orya" typeface="Kalinga"/>
+        <a:font script="Mlym" typeface="Kartika"/>
+        <a:font script="Laoo" typeface="DokChampa"/>
+        <a:font script="Sinh" typeface="Iskoola Pota"/>
+        <a:font script="Mong" typeface="Mongolian Baiti"/>
+        <a:font script="Viet" typeface="Arial"/>
+        <a:font script="Uigh" typeface="Microsoft Uighur"/>
+        <a:font script="Geor" typeface="Sylfaen"/>
+      </a:minorFont>
+    </a:fontScheme>
+    <a:fmtScheme name="Office">
+      <a:fillStyleLst>
+        <a:solidFill>
+          <a:schemeClr val="phClr"/>
+        </a:solidFill>
+        <a:gradFill rotWithShape="1">
+          <a:gsLst>
+            <a:gs pos="0">
+              <a:schemeClr val="phClr">
+                <a:tint val="50000"/>
+                <a:satMod val="300000"/>
+              </a:schemeClr>
+            </a:gs>
+            <a:gs pos="35000">
+              <a:schemeClr val="phClr">
+                <a:tint val="37000"/>
+                <a:satMod val="300000"/>
+              </a:schemeClr>
+            </a:gs>
+            <a:gs pos="100000">
+              <a:schemeClr val="phClr">
+                <a:tint val="15000"/>
+                <a:satMod val="350000"/>
+              </a:schemeClr>
+            </a:gs>
+          </a:gsLst>
+          <a:lin ang="16200000" scaled="1"/>
+        </a:gradFill>
+        <a:gradFill rotWithShape="1">
+          <a:gsLst>
+            <a:gs pos="0">
+              <a:schemeClr val="phClr">
+                <a:tint val="100000"/>
+                <a:shade val="100000"/>
+                <a:satMod val="130000"/>
+              </a:schemeClr>
+            </a:gs>
+            <a:gs pos="100000">
+              <a:schemeClr val="phClr">
+                <a:tint val="50000"/>
+                <a:shade val="100000"/>
+                <a:satMod val="350000"/>
+              </a:schemeClr>
+            </a:gs>
+          </a:gsLst>
+          <a:lin ang="16200000" scaled="0"/>
+        </a:gradFill>
+      </a:fillStyleLst>
+      <a:lnStyleLst>
+        <a:ln w="9525" cap="flat" cmpd="sng" algn="ctr">
+          <a:solidFill>
+            <a:schemeClr val="phClr">
+              <a:shade val="95000"/>
+              <a:satMod val="105000"/>
+            </a:schemeClr>
+          </a:solidFill>
+          <a:prstDash val="solid"/>
+        </a:ln>
+        <a:ln w="25400" cap="flat" cmpd="sng" algn="ctr">
+          <a:solidFill>
+            <a:schemeClr val="phClr"/>
+          </a:solidFill>
+          <a:prstDash val="solid"/>
+        </a:ln>
+        <a:ln w="38100" cap="flat" cmpd="sng" algn="ctr">
+          <a:solidFill>
+            <a:schemeClr val="phClr"/>
+          </a:solidFill>
+          <a:prstDash val="solid"/>
+        </a:ln>
+      </a:lnStyleLst>
+      <a:effectStyleLst>
+        <a:effectStyle>
+          <a:effectLst>
+            <a:outerShdw blurRad="40000" dist="20000" dir="5400000" rotWithShape="0">
+              <a:srgbClr val="000000">
+                <a:alpha val="38000"/>
+              </a:srgbClr>
+            </a:outerShdw>
+          </a:effectLst>
+        </a:effectStyle>
+        <a:effectStyle>
+          <a:effectLst>
+            <a:outerShdw blurRad="40000" dist="23000" dir="5400000" rotWithShape="0">
+              <a:srgbClr val="000000">
+                <a:alpha val="35000"/>
+              </a:srgbClr>
+            </a:outerShdw>
+          </a:effectLst>
+        </a:effectStyle>
+        <a:effectStyle>
+          <a:effectLst>
+            <a:outerShdw blurRad="40000" dist="23000" dir="5400000" rotWithShape="0">
+              <a:srgbClr val="000000">
+                <a:alpha val="35000"/>
+              </a:srgbClr>
+            </a:outerShdw>
+          </a:effectLst>
+          <a:scene3d>
+            <a:camera prst="orthographicFront">
+              <a:rot lat="0" lon="0" rev="0"/>
+            </a:camera>
+            <a:lightRig rig="threePt" dir="t">
+              <a:rot lat="0" lon="0" rev="1200000"/>
+            </a:lightRig>
+          </a:scene3d>
+          <a:sp3d>
+            <a:bevelT w="63500" h="25400"/>
+          </a:sp3d>
+        </a:effectStyle>
+      </a:effectStyleLst>
+      <a:bgFillStyleLst>
+        <a:solidFill>
+          <a:schemeClr val="phClr"/>
+        </a:solidFill>
+        <a:gradFill rotWithShape="1">
+          <a:gsLst>
+            <a:gs pos="0">
+              <a:schemeClr val="phClr">
+                <a:tint val="40000"/>
+                <a:satMod val="350000"/>
+              </a:schemeClr>
+            </a:gs>
+            <a:gs pos="40000">
+              <a:schemeClr val="phClr">
+                <a:tint val="45000"/>
+                <a:shade val="99000"/>
+                <a:satMod val="350000"/>
+              </a:schemeClr>
+            </a:gs>
+            <a:gs pos="100000">
+              <a:schemeClr val="phClr">
+                <a:shade val="20000"/>
+                <a:satMod val="255000"/>
+              </a:schemeClr>
+            </a:gs>
+          </a:gsLst>
+          <a:path path="circle">
+            <a:fillToRect l="50000" t="-80000" r="50000" b="180000"/>
+          </a:path>
+        </a:gradFill>
+        <a:gradFill rotWithShape="1">
+          <a:gsLst>
+            <a:gs pos="0">
+              <a:schemeClr val="phClr">
+                <a:tint val="80000"/>
+                <a:satMod val="300000"/>
+              </a:schemeClr>
+            </a:gs>
+            <a:gs pos="100000">
+              <a:schemeClr val="phClr">
+                <a:shade val="30000"/>
+                <a:satMod val="200000"/>
+              </a:schemeClr>
+            </a:gs>
+          </a:gsLst>
+          <a:path path="circle">
+            <a:fillToRect l="50000" t="50000" r="50000" b="50000"/>
+          </a:path>
+        </a:gradFill>
+      </a:bgFillStyleLst>
+    </a:fmtScheme>
+  </a:themeElements>
+</a:theme>
+</file>
+
+<file path=ppt/theme/theme2.xml><?xml version="1.0" encoding="utf-8"?>
 <a:theme xmlns:a="http://schemas.openxmlformats.org/drawingml/2006/main" xmlns:r="http://schemas.openxmlformats.org/officeDocument/2006/relationships" name="Tema do Office">
   <a:themeElements>
     <a:clrScheme name="Office">
@@ -17111,283 +17406,4 @@
     </a:fmtScheme>
   </a:themeElements>
 </a:theme>
-</file>
-
-<file path=ppt/theme/theme2.xml><?xml version="1.0" encoding="utf-8"?>
-<a:theme xmlns:a="http://schemas.openxmlformats.org/drawingml/2006/main" xmlns:r="http://schemas.openxmlformats.org/officeDocument/2006/relationships">
-  <a:themeElements>
-    <a:clrScheme name="Default">
-      <a:dk1>
-        <a:srgbClr val="000000"/>
-      </a:dk1>
-      <a:lt1>
-        <a:srgbClr val="FFFFFF"/>
-      </a:lt1>
-      <a:dk2>
-        <a:srgbClr val="158158"/>
-      </a:dk2>
-      <a:lt2>
-        <a:srgbClr val="F3F3F3"/>
-      </a:lt2>
-      <a:accent1>
-        <a:srgbClr val="058DC7"/>
-      </a:accent1>
-      <a:accent2>
-        <a:srgbClr val="50B432"/>
-      </a:accent2>
-      <a:accent3>
-        <a:srgbClr val="ED561B"/>
-      </a:accent3>
-      <a:accent4>
-        <a:srgbClr val="EDEF00"/>
-      </a:accent4>
-      <a:accent5>
-        <a:srgbClr val="24CBE5"/>
-      </a:accent5>
-      <a:accent6>
-        <a:srgbClr val="64E572"/>
-      </a:accent6>
-      <a:hlink>
-        <a:srgbClr val="2200CC"/>
-      </a:hlink>
-      <a:folHlink>
-        <a:srgbClr val="551A8B"/>
-      </a:folHlink>
-    </a:clrScheme>
-    <a:fontScheme name="Office">
-      <a:majorFont>
-        <a:latin typeface="Arial"/>
-        <a:ea typeface=""/>
-        <a:cs typeface=""/>
-        <a:font script="Jpan" typeface="ＭＳ Ｐゴシック"/>
-        <a:font script="Hang" typeface="맑은 고딕"/>
-        <a:font script="Hans" typeface="宋体"/>
-        <a:font script="Hant" typeface="新細明體"/>
-        <a:font script="Arab" typeface="Times New Roman"/>
-        <a:font script="Hebr" typeface="Times New Roman"/>
-        <a:font script="Thai" typeface="Angsana New"/>
-        <a:font script="Ethi" typeface="Nyala"/>
-        <a:font script="Beng" typeface="Vrinda"/>
-        <a:font script="Gujr" typeface="Shruti"/>
-        <a:font script="Khmr" typeface="MoolBoran"/>
-        <a:font script="Knda" typeface="Tunga"/>
-        <a:font script="Guru" typeface="Raavi"/>
-        <a:font script="Cans" typeface="Euphemia"/>
-        <a:font script="Cher" typeface="Plantagenet Cherokee"/>
-        <a:font script="Yiii" typeface="Microsoft Yi Baiti"/>
-        <a:font script="Tibt" typeface="Microsoft Himalaya"/>
-        <a:font script="Thaa" typeface="MV Boli"/>
-        <a:font script="Deva" typeface="Mangal"/>
-        <a:font script="Telu" typeface="Gautami"/>
-        <a:font script="Taml" typeface="Latha"/>
-        <a:font script="Syrc" typeface="Estrangelo Edessa"/>
-        <a:font script="Orya" typeface="Kalinga"/>
-        <a:font script="Mlym" typeface="Kartika"/>
-        <a:font script="Laoo" typeface="DokChampa"/>
-        <a:font script="Sinh" typeface="Iskoola Pota"/>
-        <a:font script="Mong" typeface="Mongolian Baiti"/>
-        <a:font script="Viet" typeface="Times New Roman"/>
-        <a:font script="Uigh" typeface="Microsoft Uighur"/>
-        <a:font script="Geor" typeface="Sylfaen"/>
-      </a:majorFont>
-      <a:minorFont>
-        <a:latin typeface="Arial"/>
-        <a:ea typeface=""/>
-        <a:cs typeface=""/>
-        <a:font script="Jpan" typeface="ＭＳ Ｐゴシック"/>
-        <a:font script="Hang" typeface="맑은 고딕"/>
-        <a:font script="Hans" typeface="宋体"/>
-        <a:font script="Hant" typeface="新細明體"/>
-        <a:font script="Arab" typeface="Arial"/>
-        <a:font script="Hebr" typeface="Arial"/>
-        <a:font script="Thai" typeface="Cordia New"/>
-        <a:font script="Ethi" typeface="Nyala"/>
-        <a:font script="Beng" typeface="Vrinda"/>
-        <a:font script="Gujr" typeface="Shruti"/>
-        <a:font script="Khmr" typeface="DaunPenh"/>
-        <a:font script="Knda" typeface="Tunga"/>
-        <a:font script="Guru" typeface="Raavi"/>
-        <a:font script="Cans" typeface="Euphemia"/>
-        <a:font script="Cher" typeface="Plantagenet Cherokee"/>
-        <a:font script="Yiii" typeface="Microsoft Yi Baiti"/>
-        <a:font script="Tibt" typeface="Microsoft Himalaya"/>
-        <a:font script="Thaa" typeface="MV Boli"/>
-        <a:font script="Deva" typeface="Mangal"/>
-        <a:font script="Telu" typeface="Gautami"/>
-        <a:font script="Taml" typeface="Latha"/>
-        <a:font script="Syrc" typeface="Estrangelo Edessa"/>
-        <a:font script="Orya" typeface="Kalinga"/>
-        <a:font script="Mlym" typeface="Kartika"/>
-        <a:font script="Laoo" typeface="DokChampa"/>
-        <a:font script="Sinh" typeface="Iskoola Pota"/>
-        <a:font script="Mong" typeface="Mongolian Baiti"/>
-        <a:font script="Viet" typeface="Arial"/>
-        <a:font script="Uigh" typeface="Microsoft Uighur"/>
-        <a:font script="Geor" typeface="Sylfaen"/>
-      </a:minorFont>
-    </a:fontScheme>
-    <a:fmtScheme name="Office">
-      <a:fillStyleLst>
-        <a:solidFill>
-          <a:schemeClr val="phClr"/>
-        </a:solidFill>
-        <a:gradFill rotWithShape="1">
-          <a:gsLst>
-            <a:gs pos="0">
-              <a:schemeClr val="phClr">
-                <a:tint val="50000"/>
-                <a:satMod val="300000"/>
-              </a:schemeClr>
-            </a:gs>
-            <a:gs pos="35000">
-              <a:schemeClr val="phClr">
-                <a:tint val="37000"/>
-                <a:satMod val="300000"/>
-              </a:schemeClr>
-            </a:gs>
-            <a:gs pos="100000">
-              <a:schemeClr val="phClr">
-                <a:tint val="15000"/>
-                <a:satMod val="350000"/>
-              </a:schemeClr>
-            </a:gs>
-          </a:gsLst>
-          <a:lin ang="16200000" scaled="1"/>
-        </a:gradFill>
-        <a:gradFill rotWithShape="1">
-          <a:gsLst>
-            <a:gs pos="0">
-              <a:schemeClr val="phClr">
-                <a:tint val="100000"/>
-                <a:shade val="100000"/>
-                <a:satMod val="130000"/>
-              </a:schemeClr>
-            </a:gs>
-            <a:gs pos="100000">
-              <a:schemeClr val="phClr">
-                <a:tint val="50000"/>
-                <a:shade val="100000"/>
-                <a:satMod val="350000"/>
-              </a:schemeClr>
-            </a:gs>
-          </a:gsLst>
-          <a:lin ang="16200000" scaled="0"/>
-        </a:gradFill>
-      </a:fillStyleLst>
-      <a:lnStyleLst>
-        <a:ln w="9525" cap="flat" cmpd="sng" algn="ctr">
-          <a:solidFill>
-            <a:schemeClr val="phClr">
-              <a:shade val="95000"/>
-              <a:satMod val="105000"/>
-            </a:schemeClr>
-          </a:solidFill>
-          <a:prstDash val="solid"/>
-        </a:ln>
-        <a:ln w="25400" cap="flat" cmpd="sng" algn="ctr">
-          <a:solidFill>
-            <a:schemeClr val="phClr"/>
-          </a:solidFill>
-          <a:prstDash val="solid"/>
-        </a:ln>
-        <a:ln w="38100" cap="flat" cmpd="sng" algn="ctr">
-          <a:solidFill>
-            <a:schemeClr val="phClr"/>
-          </a:solidFill>
-          <a:prstDash val="solid"/>
-        </a:ln>
-      </a:lnStyleLst>
-      <a:effectStyleLst>
-        <a:effectStyle>
-          <a:effectLst>
-            <a:outerShdw blurRad="40000" dist="20000" dir="5400000" rotWithShape="0">
-              <a:srgbClr val="000000">
-                <a:alpha val="38000"/>
-              </a:srgbClr>
-            </a:outerShdw>
-          </a:effectLst>
-        </a:effectStyle>
-        <a:effectStyle>
-          <a:effectLst>
-            <a:outerShdw blurRad="40000" dist="23000" dir="5400000" rotWithShape="0">
-              <a:srgbClr val="000000">
-                <a:alpha val="35000"/>
-              </a:srgbClr>
-            </a:outerShdw>
-          </a:effectLst>
-        </a:effectStyle>
-        <a:effectStyle>
-          <a:effectLst>
-            <a:outerShdw blurRad="40000" dist="23000" dir="5400000" rotWithShape="0">
-              <a:srgbClr val="000000">
-                <a:alpha val="35000"/>
-              </a:srgbClr>
-            </a:outerShdw>
-          </a:effectLst>
-          <a:scene3d>
-            <a:camera prst="orthographicFront">
-              <a:rot lat="0" lon="0" rev="0"/>
-            </a:camera>
-            <a:lightRig rig="threePt" dir="t">
-              <a:rot lat="0" lon="0" rev="1200000"/>
-            </a:lightRig>
-          </a:scene3d>
-          <a:sp3d>
-            <a:bevelT w="63500" h="25400"/>
-          </a:sp3d>
-        </a:effectStyle>
-      </a:effectStyleLst>
-      <a:bgFillStyleLst>
-        <a:solidFill>
-          <a:schemeClr val="phClr"/>
-        </a:solidFill>
-        <a:gradFill rotWithShape="1">
-          <a:gsLst>
-            <a:gs pos="0">
-              <a:schemeClr val="phClr">
-                <a:tint val="40000"/>
-                <a:satMod val="350000"/>
-              </a:schemeClr>
-            </a:gs>
-            <a:gs pos="40000">
-              <a:schemeClr val="phClr">
-                <a:tint val="45000"/>
-                <a:shade val="99000"/>
-                <a:satMod val="350000"/>
-              </a:schemeClr>
-            </a:gs>
-            <a:gs pos="100000">
-              <a:schemeClr val="phClr">
-                <a:shade val="20000"/>
-                <a:satMod val="255000"/>
-              </a:schemeClr>
-            </a:gs>
-          </a:gsLst>
-          <a:path path="circle">
-            <a:fillToRect l="50000" t="-80000" r="50000" b="180000"/>
-          </a:path>
-        </a:gradFill>
-        <a:gradFill rotWithShape="1">
-          <a:gsLst>
-            <a:gs pos="0">
-              <a:schemeClr val="phClr">
-                <a:tint val="80000"/>
-                <a:satMod val="300000"/>
-              </a:schemeClr>
-            </a:gs>
-            <a:gs pos="100000">
-              <a:schemeClr val="phClr">
-                <a:shade val="30000"/>
-                <a:satMod val="200000"/>
-              </a:schemeClr>
-            </a:gs>
-          </a:gsLst>
-          <a:path path="circle">
-            <a:fillToRect l="50000" t="50000" r="50000" b="50000"/>
-          </a:path>
-        </a:gradFill>
-      </a:bgFillStyleLst>
-    </a:fmtScheme>
-  </a:themeElements>
-</a:theme>
 </file>
</xml_diff>